<commit_message>
Ok, saving the pptx before pushing to git is also a good idea
</commit_message>
<xml_diff>
--- a/statistics-an-unreliable-friend/sql-day-poland-20210511/statistics-an-unreliable-friend-sql-day-2021.pptx
+++ b/statistics-an-unreliable-friend/sql-day-poland-20210511/statistics-an-unreliable-friend-sql-day-2021.pptx
@@ -5,17 +5,16 @@
     <p:sldMasterId id="2147483648" r:id="rId1"/>
   </p:sldMasterIdLst>
   <p:notesMasterIdLst>
-    <p:notesMasterId r:id="rId10"/>
+    <p:notesMasterId r:id="rId9"/>
   </p:notesMasterIdLst>
   <p:sldIdLst>
     <p:sldId id="266" r:id="rId2"/>
     <p:sldId id="256" r:id="rId3"/>
-    <p:sldId id="259" r:id="rId4"/>
-    <p:sldId id="262" r:id="rId5"/>
-    <p:sldId id="261" r:id="rId6"/>
-    <p:sldId id="263" r:id="rId7"/>
-    <p:sldId id="265" r:id="rId8"/>
-    <p:sldId id="267" r:id="rId9"/>
+    <p:sldId id="268" r:id="rId4"/>
+    <p:sldId id="259" r:id="rId5"/>
+    <p:sldId id="265" r:id="rId6"/>
+    <p:sldId id="269" r:id="rId7"/>
+    <p:sldId id="267" r:id="rId8"/>
   </p:sldIdLst>
   <p:sldSz cx="12192000" cy="6858000"/>
   <p:notesSz cx="6858000" cy="9144000"/>
@@ -207,7 +206,7 @@
           <a:p>
             <a:fld id="{41BA16C2-1CA2-4095-8729-8FA338733D6E}" type="datetimeFigureOut">
               <a:rPr lang="en-US" smtClean="0"/>
-              <a:t>5/5/2021</a:t>
+              <a:t>5/10/2021</a:t>
             </a:fld>
             <a:endParaRPr lang="en-US"/>
           </a:p>
@@ -621,7 +620,7 @@
           <a:p>
             <a:fld id="{50BD2379-39E1-4981-BB93-7A82CE98D661}" type="datetime1">
               <a:rPr lang="en-US" smtClean="0"/>
-              <a:t>5/5/2021</a:t>
+              <a:t>5/10/2021</a:t>
             </a:fld>
             <a:endParaRPr lang="en-US"/>
           </a:p>
@@ -822,7 +821,7 @@
           <a:p>
             <a:fld id="{89E155A6-EA81-4D3B-919C-AD3D73AA914E}" type="datetime1">
               <a:rPr lang="en-US" smtClean="0"/>
-              <a:t>5/5/2021</a:t>
+              <a:t>5/10/2021</a:t>
             </a:fld>
             <a:endParaRPr lang="en-US"/>
           </a:p>
@@ -1033,7 +1032,7 @@
           <a:p>
             <a:fld id="{6683B534-B10A-4FFF-B7A6-2BE6BF7A7346}" type="datetime1">
               <a:rPr lang="en-US" smtClean="0"/>
-              <a:t>5/5/2021</a:t>
+              <a:t>5/10/2021</a:t>
             </a:fld>
             <a:endParaRPr lang="en-US"/>
           </a:p>
@@ -1497,7 +1496,7 @@
           <a:p>
             <a:fld id="{A1411404-B01E-47A9-BF33-96FC106B7A7E}" type="datetime1">
               <a:rPr lang="en-US" smtClean="0"/>
-              <a:t>5/5/2021</a:t>
+              <a:t>5/10/2021</a:t>
             </a:fld>
             <a:endParaRPr lang="en-US"/>
           </a:p>
@@ -2165,7 +2164,7 @@
           <a:p>
             <a:fld id="{BF409370-8682-45AF-BA23-C704BA290E1D}" type="datetime1">
               <a:rPr lang="en-US" smtClean="0"/>
-              <a:t>5/5/2021</a:t>
+              <a:t>5/10/2021</a:t>
             </a:fld>
             <a:endParaRPr lang="en-US"/>
           </a:p>
@@ -2309,7 +2308,7 @@
           <a:p>
             <a:fld id="{CF1EEFA3-436A-4BB4-9D67-E434B145A9AD}" type="datetime1">
               <a:rPr lang="en-US" smtClean="0"/>
-              <a:t>5/5/2021</a:t>
+              <a:t>5/10/2021</a:t>
             </a:fld>
             <a:endParaRPr lang="en-US"/>
           </a:p>
@@ -2425,7 +2424,7 @@
           <a:p>
             <a:fld id="{382B760A-8723-4265-9CFE-067BA0B5628F}" type="datetime1">
               <a:rPr lang="en-US" smtClean="0"/>
-              <a:t>5/5/2021</a:t>
+              <a:t>5/10/2021</a:t>
             </a:fld>
             <a:endParaRPr lang="en-US"/>
           </a:p>
@@ -2739,7 +2738,7 @@
           <a:p>
             <a:fld id="{449E3EAB-DD4C-4B91-81B1-660AF17C458E}" type="datetime1">
               <a:rPr lang="en-US" smtClean="0"/>
-              <a:t>5/5/2021</a:t>
+              <a:t>5/10/2021</a:t>
             </a:fld>
             <a:endParaRPr lang="en-US"/>
           </a:p>
@@ -3030,7 +3029,7 @@
           <a:p>
             <a:fld id="{A0FB7E36-A439-402F-9FC0-894F20BC5C27}" type="datetime1">
               <a:rPr lang="en-US" smtClean="0"/>
-              <a:t>5/5/2021</a:t>
+              <a:t>5/10/2021</a:t>
             </a:fld>
             <a:endParaRPr lang="en-US"/>
           </a:p>
@@ -3274,7 +3273,7 @@
           <a:p>
             <a:fld id="{5427E2AC-683C-4D92-A3F2-E71CD1A59666}" type="datetime1">
               <a:rPr lang="en-US" smtClean="0"/>
-              <a:t>5/5/2021</a:t>
+              <a:t>5/10/2021</a:t>
             </a:fld>
             <a:endParaRPr lang="en-US"/>
           </a:p>
@@ -3819,7 +3818,7 @@
           <a:lstStyle/>
           <a:p>
             <a:r>
-              <a:rPr lang="pl-PL" sz="4800" spc="300" dirty="0">
+              <a:rPr lang="sv-SE" sz="4800" spc="300" dirty="0" err="1">
                 <a:solidFill>
                   <a:schemeClr val="tx1">
                     <a:lumMod val="75000"/>
@@ -3827,7 +3826,51 @@
                   </a:schemeClr>
                 </a:solidFill>
               </a:rPr>
-              <a:t>TITLE OF PRESENTATION</a:t>
+              <a:t>Statistics</a:t>
+            </a:r>
+            <a:r>
+              <a:rPr lang="sv-SE" sz="4800" spc="300" dirty="0">
+                <a:solidFill>
+                  <a:schemeClr val="tx1">
+                    <a:lumMod val="75000"/>
+                    <a:lumOff val="25000"/>
+                  </a:schemeClr>
+                </a:solidFill>
+              </a:rPr>
+              <a:t> an </a:t>
+            </a:r>
+            <a:r>
+              <a:rPr lang="sv-SE" sz="4800" spc="300" dirty="0" err="1">
+                <a:solidFill>
+                  <a:schemeClr val="tx1">
+                    <a:lumMod val="75000"/>
+                    <a:lumOff val="25000"/>
+                  </a:schemeClr>
+                </a:solidFill>
+              </a:rPr>
+              <a:t>unreliable</a:t>
+            </a:r>
+            <a:r>
+              <a:rPr lang="sv-SE" sz="4800" spc="300" dirty="0">
+                <a:solidFill>
+                  <a:schemeClr val="tx1">
+                    <a:lumMod val="75000"/>
+                    <a:lumOff val="25000"/>
+                  </a:schemeClr>
+                </a:solidFill>
+              </a:rPr>
+              <a:t> </a:t>
+            </a:r>
+            <a:r>
+              <a:rPr lang="sv-SE" sz="4800" spc="300" dirty="0" err="1">
+                <a:solidFill>
+                  <a:schemeClr val="tx1">
+                    <a:lumMod val="75000"/>
+                    <a:lumOff val="25000"/>
+                  </a:schemeClr>
+                </a:solidFill>
+              </a:rPr>
+              <a:t>friend</a:t>
             </a:r>
             <a:endParaRPr lang="en-US" sz="4800" spc="300" dirty="0">
               <a:solidFill>
@@ -3867,16 +3910,10 @@
           <a:lstStyle/>
           <a:p>
             <a:r>
-              <a:rPr lang="pl-PL" dirty="0">
+              <a:rPr lang="sv-SE" dirty="0">
                 <a:latin typeface="+mj-lt"/>
               </a:rPr>
-              <a:t>John </a:t>
-            </a:r>
-            <a:r>
-              <a:rPr lang="pl-PL" dirty="0" err="1">
-                <a:latin typeface="+mj-lt"/>
-              </a:rPr>
-              <a:t>Doe</a:t>
+              <a:t>Magnus Ahlkvist</a:t>
             </a:r>
             <a:endParaRPr lang="en-US" dirty="0">
               <a:latin typeface="+mj-lt"/>
@@ -3978,6 +4015,222 @@
 <file path=ppt/slides/slide3.xml><?xml version="1.0" encoding="utf-8"?>
 <p:sld xmlns:a="http://schemas.openxmlformats.org/drawingml/2006/main" xmlns:r="http://schemas.openxmlformats.org/officeDocument/2006/relationships" xmlns:p="http://schemas.openxmlformats.org/presentationml/2006/main">
   <p:cSld>
+    <p:spTree>
+      <p:nvGrpSpPr>
+        <p:cNvPr id="1" name=""/>
+        <p:cNvGrpSpPr/>
+        <p:nvPr/>
+      </p:nvGrpSpPr>
+      <p:grpSpPr>
+        <a:xfrm>
+          <a:off x="0" y="0"/>
+          <a:ext cx="0" cy="0"/>
+          <a:chOff x="0" y="0"/>
+          <a:chExt cx="0" cy="0"/>
+        </a:xfrm>
+      </p:grpSpPr>
+      <p:sp>
+        <p:nvSpPr>
+          <p:cNvPr id="5" name="Rubrik 4">
+            <a:extLst>
+              <a:ext uri="{FF2B5EF4-FFF2-40B4-BE49-F238E27FC236}">
+                <a16:creationId xmlns:a16="http://schemas.microsoft.com/office/drawing/2014/main" id="{C55CC4B6-6115-457C-8AFE-48CB3C520649}"/>
+              </a:ext>
+            </a:extLst>
+          </p:cNvPr>
+          <p:cNvSpPr>
+            <a:spLocks noGrp="1"/>
+          </p:cNvSpPr>
+          <p:nvPr>
+            <p:ph type="title"/>
+          </p:nvPr>
+        </p:nvSpPr>
+        <p:spPr/>
+        <p:txBody>
+          <a:bodyPr/>
+          <a:lstStyle/>
+          <a:p>
+            <a:r>
+              <a:rPr lang="sv-SE" dirty="0"/>
+              <a:t>Magnus</a:t>
+            </a:r>
+          </a:p>
+        </p:txBody>
+      </p:sp>
+      <p:sp>
+        <p:nvSpPr>
+          <p:cNvPr id="6" name="Platshållare för innehåll 5">
+            <a:extLst>
+              <a:ext uri="{FF2B5EF4-FFF2-40B4-BE49-F238E27FC236}">
+                <a16:creationId xmlns:a16="http://schemas.microsoft.com/office/drawing/2014/main" id="{F08C41F8-5A03-45E2-8147-8E8E4FFD1497}"/>
+              </a:ext>
+            </a:extLst>
+          </p:cNvPr>
+          <p:cNvSpPr>
+            <a:spLocks noGrp="1"/>
+          </p:cNvSpPr>
+          <p:nvPr>
+            <p:ph idx="1"/>
+          </p:nvPr>
+        </p:nvSpPr>
+        <p:spPr/>
+        <p:txBody>
+          <a:bodyPr/>
+          <a:lstStyle/>
+          <a:p>
+            <a:pPr marL="0" indent="0">
+              <a:buNone/>
+            </a:pPr>
+            <a:r>
+              <a:rPr lang="sv-SE" dirty="0" err="1"/>
+              <a:t>Transmokopter</a:t>
+            </a:r>
+            <a:r>
+              <a:rPr lang="sv-SE" dirty="0"/>
+              <a:t> SQL AB – SQL Server </a:t>
+            </a:r>
+            <a:r>
+              <a:rPr lang="sv-SE" dirty="0" err="1"/>
+              <a:t>consultant</a:t>
+            </a:r>
+            <a:endParaRPr lang="sv-SE" dirty="0"/>
+          </a:p>
+          <a:p>
+            <a:pPr marL="0" indent="0">
+              <a:buNone/>
+            </a:pPr>
+            <a:r>
+              <a:rPr lang="sv-SE" dirty="0"/>
+              <a:t>Data </a:t>
+            </a:r>
+            <a:r>
+              <a:rPr lang="sv-SE" dirty="0" err="1"/>
+              <a:t>Platform</a:t>
+            </a:r>
+            <a:r>
+              <a:rPr lang="sv-SE" dirty="0"/>
+              <a:t> MVP</a:t>
+            </a:r>
+          </a:p>
+          <a:p>
+            <a:pPr marL="0" indent="0">
+              <a:buNone/>
+            </a:pPr>
+            <a:r>
+              <a:rPr lang="sv-SE" dirty="0"/>
+              <a:t>Microsoft </a:t>
+            </a:r>
+            <a:r>
+              <a:rPr lang="sv-SE" dirty="0" err="1"/>
+              <a:t>Certified</a:t>
+            </a:r>
+            <a:r>
+              <a:rPr lang="sv-SE" dirty="0"/>
+              <a:t> </a:t>
+            </a:r>
+            <a:r>
+              <a:rPr lang="sv-SE" dirty="0" err="1"/>
+              <a:t>Trainer</a:t>
+            </a:r>
+            <a:endParaRPr lang="sv-SE" dirty="0"/>
+          </a:p>
+          <a:p>
+            <a:pPr marL="0" indent="0">
+              <a:buNone/>
+            </a:pPr>
+            <a:r>
+              <a:rPr lang="sv-SE" dirty="0">
+                <a:hlinkClick r:id="rId2"/>
+              </a:rPr>
+              <a:t>magnus@transmokopter.se</a:t>
+            </a:r>
+            <a:endParaRPr lang="sv-SE" dirty="0"/>
+          </a:p>
+          <a:p>
+            <a:pPr marL="0" indent="0">
+              <a:buNone/>
+            </a:pPr>
+            <a:r>
+              <a:rPr lang="sv-SE" dirty="0"/>
+              <a:t>@transmokopter on Twitter</a:t>
+            </a:r>
+          </a:p>
+          <a:p>
+            <a:pPr marL="0" indent="0">
+              <a:buNone/>
+            </a:pPr>
+            <a:r>
+              <a:rPr lang="sv-SE" dirty="0" err="1"/>
+              <a:t>transmokopter</a:t>
+            </a:r>
+            <a:r>
+              <a:rPr lang="sv-SE" dirty="0"/>
+              <a:t> on </a:t>
+            </a:r>
+            <a:r>
+              <a:rPr lang="sv-SE" dirty="0" err="1"/>
+              <a:t>github</a:t>
+            </a:r>
+            <a:endParaRPr lang="sv-SE" dirty="0"/>
+          </a:p>
+          <a:p>
+            <a:pPr marL="0" indent="0">
+              <a:buNone/>
+            </a:pPr>
+            <a:endParaRPr lang="sv-SE" dirty="0"/>
+          </a:p>
+          <a:p>
+            <a:pPr marL="0" indent="0">
+              <a:buNone/>
+            </a:pPr>
+            <a:endParaRPr lang="sv-SE" dirty="0"/>
+          </a:p>
+        </p:txBody>
+      </p:sp>
+      <p:sp>
+        <p:nvSpPr>
+          <p:cNvPr id="4" name="Platshållare för sidfot 3">
+            <a:extLst>
+              <a:ext uri="{FF2B5EF4-FFF2-40B4-BE49-F238E27FC236}">
+                <a16:creationId xmlns:a16="http://schemas.microsoft.com/office/drawing/2014/main" id="{24071049-6411-4CAA-91B4-1E0DCA9FC788}"/>
+              </a:ext>
+            </a:extLst>
+          </p:cNvPr>
+          <p:cNvSpPr>
+            <a:spLocks noGrp="1"/>
+          </p:cNvSpPr>
+          <p:nvPr>
+            <p:ph type="ftr" sz="quarter" idx="11"/>
+          </p:nvPr>
+        </p:nvSpPr>
+        <p:spPr/>
+        <p:txBody>
+          <a:bodyPr/>
+          <a:lstStyle/>
+          <a:p>
+            <a:r>
+              <a:rPr lang="en-US"/>
+              <a:t>SQLDay 2020</a:t>
+            </a:r>
+          </a:p>
+        </p:txBody>
+      </p:sp>
+    </p:spTree>
+    <p:extLst>
+      <p:ext uri="{BB962C8B-B14F-4D97-AF65-F5344CB8AC3E}">
+        <p14:creationId xmlns:p14="http://schemas.microsoft.com/office/powerpoint/2010/main" val="1534448490"/>
+      </p:ext>
+    </p:extLst>
+  </p:cSld>
+  <p:clrMapOvr>
+    <a:masterClrMapping/>
+  </p:clrMapOvr>
+</p:sld>
+</file>
+
+<file path=ppt/slides/slide4.xml><?xml version="1.0" encoding="utf-8"?>
+<p:sld xmlns:a="http://schemas.openxmlformats.org/drawingml/2006/main" xmlns:r="http://schemas.openxmlformats.org/officeDocument/2006/relationships" xmlns:p="http://schemas.openxmlformats.org/presentationml/2006/main">
+  <p:cSld>
     <p:bg>
       <p:bgPr>
         <a:blipFill dpi="0" rotWithShape="1">
@@ -4070,48 +4323,10 @@
               </a:lnSpc>
             </a:pPr>
             <a:r>
-              <a:rPr lang="pl-PL" sz="2400" dirty="0">
+              <a:rPr lang="en-US" sz="2400" dirty="0">
                 <a:latin typeface="+mj-lt"/>
               </a:rPr>
-              <a:t>Point 1</a:t>
-            </a:r>
-          </a:p>
-          <a:p>
-            <a:pPr lvl="1">
-              <a:lnSpc>
-                <a:spcPct val="150000"/>
-              </a:lnSpc>
-            </a:pPr>
-            <a:r>
-              <a:rPr lang="pl-PL" dirty="0" err="1">
-                <a:latin typeface="+mj-lt"/>
-              </a:rPr>
-              <a:t>Subsection</a:t>
-            </a:r>
-            <a:r>
-              <a:rPr lang="pl-PL" dirty="0">
-                <a:latin typeface="+mj-lt"/>
-              </a:rPr>
-              <a:t> 1</a:t>
-            </a:r>
-          </a:p>
-          <a:p>
-            <a:pPr lvl="1">
-              <a:lnSpc>
-                <a:spcPct val="150000"/>
-              </a:lnSpc>
-            </a:pPr>
-            <a:r>
-              <a:rPr lang="pl-PL" dirty="0" err="1">
-                <a:latin typeface="+mj-lt"/>
-              </a:rPr>
-              <a:t>Subsection</a:t>
-            </a:r>
-            <a:r>
-              <a:rPr lang="pl-PL" dirty="0">
-                <a:latin typeface="+mj-lt"/>
-              </a:rPr>
-              <a:t> 2</a:t>
+              <a:t>Why did I create this presentation?</a:t>
             </a:r>
           </a:p>
           <a:p>
@@ -4121,27 +4336,11 @@
               </a:lnSpc>
             </a:pPr>
             <a:r>
-              <a:rPr lang="pl-PL" sz="2400" dirty="0">
+              <a:rPr lang="en-US" sz="2400" dirty="0">
                 <a:latin typeface="+mj-lt"/>
               </a:rPr>
-              <a:t>Point 2</a:t>
-            </a:r>
-          </a:p>
-          <a:p>
-            <a:pPr>
-              <a:lnSpc>
-                <a:spcPct val="150000"/>
-              </a:lnSpc>
-            </a:pPr>
-            <a:r>
-              <a:rPr lang="pl-PL" sz="2400" dirty="0">
-                <a:latin typeface="+mj-lt"/>
-              </a:rPr>
-              <a:t>Point 3</a:t>
-            </a:r>
-            <a:endParaRPr lang="en-US" sz="2400" dirty="0">
-              <a:latin typeface="+mj-lt"/>
-            </a:endParaRPr>
+              <a:t>Demos</a:t>
+            </a:r>
           </a:p>
         </p:txBody>
       </p:sp>
@@ -4236,599 +4435,6 @@
 </p:sld>
 </file>
 
-<file path=ppt/slides/slide4.xml><?xml version="1.0" encoding="utf-8"?>
-<p:sld xmlns:a="http://schemas.openxmlformats.org/drawingml/2006/main" xmlns:r="http://schemas.openxmlformats.org/officeDocument/2006/relationships" xmlns:p="http://schemas.openxmlformats.org/presentationml/2006/main">
-  <p:cSld>
-    <p:bg>
-      <p:bgPr>
-        <a:blipFill dpi="0" rotWithShape="1">
-          <a:blip r:embed="rId2">
-            <a:lum/>
-          </a:blip>
-          <a:srcRect/>
-          <a:stretch>
-            <a:fillRect/>
-          </a:stretch>
-        </a:blipFill>
-        <a:effectLst/>
-      </p:bgPr>
-    </p:bg>
-    <p:spTree>
-      <p:nvGrpSpPr>
-        <p:cNvPr id="1" name=""/>
-        <p:cNvGrpSpPr/>
-        <p:nvPr/>
-      </p:nvGrpSpPr>
-      <p:grpSpPr>
-        <a:xfrm>
-          <a:off x="0" y="0"/>
-          <a:ext cx="0" cy="0"/>
-          <a:chOff x="0" y="0"/>
-          <a:chExt cx="0" cy="0"/>
-        </a:xfrm>
-      </p:grpSpPr>
-      <p:sp>
-        <p:nvSpPr>
-          <p:cNvPr id="2" name="Title 1">
-            <a:extLst>
-              <a:ext uri="{FF2B5EF4-FFF2-40B4-BE49-F238E27FC236}">
-                <a16:creationId xmlns:a16="http://schemas.microsoft.com/office/drawing/2014/main" id="{69C35FEE-CDB8-4B2A-8C27-DF337C5BF54E}"/>
-              </a:ext>
-            </a:extLst>
-          </p:cNvPr>
-          <p:cNvSpPr>
-            <a:spLocks noGrp="1"/>
-          </p:cNvSpPr>
-          <p:nvPr>
-            <p:ph type="title"/>
-          </p:nvPr>
-        </p:nvSpPr>
-        <p:spPr>
-          <a:xfrm>
-            <a:off x="831850" y="1709739"/>
-            <a:ext cx="10515600" cy="2496502"/>
-          </a:xfrm>
-        </p:spPr>
-        <p:txBody>
-          <a:bodyPr/>
-          <a:lstStyle/>
-          <a:p>
-            <a:r>
-              <a:rPr lang="pl-PL" dirty="0"/>
-              <a:t>POINT 1</a:t>
-            </a:r>
-            <a:endParaRPr lang="en-US" dirty="0"/>
-          </a:p>
-        </p:txBody>
-      </p:sp>
-      <p:sp>
-        <p:nvSpPr>
-          <p:cNvPr id="3" name="Text Placeholder 2">
-            <a:extLst>
-              <a:ext uri="{FF2B5EF4-FFF2-40B4-BE49-F238E27FC236}">
-                <a16:creationId xmlns:a16="http://schemas.microsoft.com/office/drawing/2014/main" id="{C57BFC19-642C-46C0-8599-428A8D1F06F5}"/>
-              </a:ext>
-            </a:extLst>
-          </p:cNvPr>
-          <p:cNvSpPr>
-            <a:spLocks noGrp="1"/>
-          </p:cNvSpPr>
-          <p:nvPr>
-            <p:ph type="body" idx="1"/>
-          </p:nvPr>
-        </p:nvSpPr>
-        <p:spPr/>
-        <p:txBody>
-          <a:bodyPr>
-            <a:normAutofit fontScale="92500" lnSpcReduction="10000"/>
-          </a:bodyPr>
-          <a:lstStyle/>
-          <a:p>
-            <a:pPr algn="just">
-              <a:lnSpc>
-                <a:spcPct val="150000"/>
-              </a:lnSpc>
-            </a:pPr>
-            <a:r>
-              <a:rPr lang="en-US" dirty="0">
-                <a:solidFill>
-                  <a:schemeClr val="tx1">
-                    <a:lumMod val="65000"/>
-                    <a:lumOff val="35000"/>
-                  </a:schemeClr>
-                </a:solidFill>
-                <a:latin typeface="+mj-lt"/>
-              </a:rPr>
-              <a:t>Lorem ipsum dolor sit </a:t>
-            </a:r>
-            <a:r>
-              <a:rPr lang="en-US" dirty="0" err="1">
-                <a:solidFill>
-                  <a:schemeClr val="tx1">
-                    <a:lumMod val="65000"/>
-                    <a:lumOff val="35000"/>
-                  </a:schemeClr>
-                </a:solidFill>
-                <a:latin typeface="+mj-lt"/>
-              </a:rPr>
-              <a:t>amet</a:t>
-            </a:r>
-            <a:r>
-              <a:rPr lang="en-US" dirty="0">
-                <a:solidFill>
-                  <a:schemeClr val="tx1">
-                    <a:lumMod val="65000"/>
-                    <a:lumOff val="35000"/>
-                  </a:schemeClr>
-                </a:solidFill>
-                <a:latin typeface="+mj-lt"/>
-              </a:rPr>
-              <a:t>, </a:t>
-            </a:r>
-            <a:r>
-              <a:rPr lang="en-US" dirty="0" err="1">
-                <a:solidFill>
-                  <a:schemeClr val="tx1">
-                    <a:lumMod val="65000"/>
-                    <a:lumOff val="35000"/>
-                  </a:schemeClr>
-                </a:solidFill>
-                <a:latin typeface="+mj-lt"/>
-              </a:rPr>
-              <a:t>consectetuer</a:t>
-            </a:r>
-            <a:r>
-              <a:rPr lang="en-US" dirty="0">
-                <a:solidFill>
-                  <a:schemeClr val="tx1">
-                    <a:lumMod val="65000"/>
-                    <a:lumOff val="35000"/>
-                  </a:schemeClr>
-                </a:solidFill>
-                <a:latin typeface="+mj-lt"/>
-              </a:rPr>
-              <a:t> </a:t>
-            </a:r>
-            <a:r>
-              <a:rPr lang="en-US" dirty="0" err="1">
-                <a:solidFill>
-                  <a:schemeClr val="tx1">
-                    <a:lumMod val="65000"/>
-                    <a:lumOff val="35000"/>
-                  </a:schemeClr>
-                </a:solidFill>
-                <a:latin typeface="+mj-lt"/>
-              </a:rPr>
-              <a:t>adipiscing</a:t>
-            </a:r>
-            <a:r>
-              <a:rPr lang="en-US" dirty="0">
-                <a:solidFill>
-                  <a:schemeClr val="tx1">
-                    <a:lumMod val="65000"/>
-                    <a:lumOff val="35000"/>
-                  </a:schemeClr>
-                </a:solidFill>
-                <a:latin typeface="+mj-lt"/>
-              </a:rPr>
-              <a:t> </a:t>
-            </a:r>
-            <a:r>
-              <a:rPr lang="en-US" dirty="0" err="1">
-                <a:solidFill>
-                  <a:schemeClr val="tx1">
-                    <a:lumMod val="65000"/>
-                    <a:lumOff val="35000"/>
-                  </a:schemeClr>
-                </a:solidFill>
-                <a:latin typeface="+mj-lt"/>
-              </a:rPr>
-              <a:t>elit</a:t>
-            </a:r>
-            <a:r>
-              <a:rPr lang="en-US" dirty="0">
-                <a:solidFill>
-                  <a:schemeClr val="tx1">
-                    <a:lumMod val="65000"/>
-                    <a:lumOff val="35000"/>
-                  </a:schemeClr>
-                </a:solidFill>
-                <a:latin typeface="+mj-lt"/>
-              </a:rPr>
-              <a:t>. Maecenas </a:t>
-            </a:r>
-            <a:r>
-              <a:rPr lang="en-US" dirty="0" err="1">
-                <a:solidFill>
-                  <a:schemeClr val="tx1">
-                    <a:lumMod val="65000"/>
-                    <a:lumOff val="35000"/>
-                  </a:schemeClr>
-                </a:solidFill>
-                <a:latin typeface="+mj-lt"/>
-              </a:rPr>
-              <a:t>porttitor</a:t>
-            </a:r>
-            <a:r>
-              <a:rPr lang="en-US" dirty="0">
-                <a:solidFill>
-                  <a:schemeClr val="tx1">
-                    <a:lumMod val="65000"/>
-                    <a:lumOff val="35000"/>
-                  </a:schemeClr>
-                </a:solidFill>
-                <a:latin typeface="+mj-lt"/>
-              </a:rPr>
-              <a:t> </a:t>
-            </a:r>
-            <a:r>
-              <a:rPr lang="en-US" dirty="0" err="1">
-                <a:solidFill>
-                  <a:schemeClr val="tx1">
-                    <a:lumMod val="65000"/>
-                    <a:lumOff val="35000"/>
-                  </a:schemeClr>
-                </a:solidFill>
-                <a:latin typeface="+mj-lt"/>
-              </a:rPr>
-              <a:t>congue</a:t>
-            </a:r>
-            <a:r>
-              <a:rPr lang="en-US" dirty="0">
-                <a:solidFill>
-                  <a:schemeClr val="tx1">
-                    <a:lumMod val="65000"/>
-                    <a:lumOff val="35000"/>
-                  </a:schemeClr>
-                </a:solidFill>
-                <a:latin typeface="+mj-lt"/>
-              </a:rPr>
-              <a:t> </a:t>
-            </a:r>
-            <a:r>
-              <a:rPr lang="en-US" dirty="0" err="1">
-                <a:solidFill>
-                  <a:schemeClr val="tx1">
-                    <a:lumMod val="65000"/>
-                    <a:lumOff val="35000"/>
-                  </a:schemeClr>
-                </a:solidFill>
-                <a:latin typeface="+mj-lt"/>
-              </a:rPr>
-              <a:t>massa</a:t>
-            </a:r>
-            <a:r>
-              <a:rPr lang="en-US" dirty="0">
-                <a:solidFill>
-                  <a:schemeClr val="tx1">
-                    <a:lumMod val="65000"/>
-                    <a:lumOff val="35000"/>
-                  </a:schemeClr>
-                </a:solidFill>
-                <a:latin typeface="+mj-lt"/>
-              </a:rPr>
-              <a:t>. </a:t>
-            </a:r>
-            <a:r>
-              <a:rPr lang="en-US" dirty="0" err="1">
-                <a:solidFill>
-                  <a:schemeClr val="tx1">
-                    <a:lumMod val="65000"/>
-                    <a:lumOff val="35000"/>
-                  </a:schemeClr>
-                </a:solidFill>
-                <a:latin typeface="+mj-lt"/>
-              </a:rPr>
-              <a:t>Fusce</a:t>
-            </a:r>
-            <a:r>
-              <a:rPr lang="en-US" dirty="0">
-                <a:solidFill>
-                  <a:schemeClr val="tx1">
-                    <a:lumMod val="65000"/>
-                    <a:lumOff val="35000"/>
-                  </a:schemeClr>
-                </a:solidFill>
-                <a:latin typeface="+mj-lt"/>
-              </a:rPr>
-              <a:t> </a:t>
-            </a:r>
-            <a:r>
-              <a:rPr lang="en-US" dirty="0" err="1">
-                <a:solidFill>
-                  <a:schemeClr val="tx1">
-                    <a:lumMod val="65000"/>
-                    <a:lumOff val="35000"/>
-                  </a:schemeClr>
-                </a:solidFill>
-                <a:latin typeface="+mj-lt"/>
-              </a:rPr>
-              <a:t>posuere</a:t>
-            </a:r>
-            <a:r>
-              <a:rPr lang="en-US" dirty="0">
-                <a:solidFill>
-                  <a:schemeClr val="tx1">
-                    <a:lumMod val="65000"/>
-                    <a:lumOff val="35000"/>
-                  </a:schemeClr>
-                </a:solidFill>
-                <a:latin typeface="+mj-lt"/>
-              </a:rPr>
-              <a:t>, magna sed pulvinar </a:t>
-            </a:r>
-            <a:r>
-              <a:rPr lang="en-US" dirty="0" err="1">
-                <a:solidFill>
-                  <a:schemeClr val="tx1">
-                    <a:lumMod val="65000"/>
-                    <a:lumOff val="35000"/>
-                  </a:schemeClr>
-                </a:solidFill>
-                <a:latin typeface="+mj-lt"/>
-              </a:rPr>
-              <a:t>ultricies</a:t>
-            </a:r>
-            <a:r>
-              <a:rPr lang="en-US" dirty="0">
-                <a:solidFill>
-                  <a:schemeClr val="tx1">
-                    <a:lumMod val="65000"/>
-                    <a:lumOff val="35000"/>
-                  </a:schemeClr>
-                </a:solidFill>
-                <a:latin typeface="+mj-lt"/>
-              </a:rPr>
-              <a:t>, </a:t>
-            </a:r>
-            <a:r>
-              <a:rPr lang="en-US" dirty="0" err="1">
-                <a:solidFill>
-                  <a:schemeClr val="tx1">
-                    <a:lumMod val="65000"/>
-                    <a:lumOff val="35000"/>
-                  </a:schemeClr>
-                </a:solidFill>
-                <a:latin typeface="+mj-lt"/>
-              </a:rPr>
-              <a:t>purus</a:t>
-            </a:r>
-            <a:r>
-              <a:rPr lang="en-US" dirty="0">
-                <a:solidFill>
-                  <a:schemeClr val="tx1">
-                    <a:lumMod val="65000"/>
-                    <a:lumOff val="35000"/>
-                  </a:schemeClr>
-                </a:solidFill>
-                <a:latin typeface="+mj-lt"/>
-              </a:rPr>
-              <a:t> </a:t>
-            </a:r>
-            <a:r>
-              <a:rPr lang="en-US" dirty="0" err="1">
-                <a:solidFill>
-                  <a:schemeClr val="tx1">
-                    <a:lumMod val="65000"/>
-                    <a:lumOff val="35000"/>
-                  </a:schemeClr>
-                </a:solidFill>
-                <a:latin typeface="+mj-lt"/>
-              </a:rPr>
-              <a:t>lectus</a:t>
-            </a:r>
-            <a:r>
-              <a:rPr lang="en-US" dirty="0">
-                <a:solidFill>
-                  <a:schemeClr val="tx1">
-                    <a:lumMod val="65000"/>
-                    <a:lumOff val="35000"/>
-                  </a:schemeClr>
-                </a:solidFill>
-                <a:latin typeface="+mj-lt"/>
-              </a:rPr>
-              <a:t> </a:t>
-            </a:r>
-            <a:r>
-              <a:rPr lang="en-US" dirty="0" err="1">
-                <a:solidFill>
-                  <a:schemeClr val="tx1">
-                    <a:lumMod val="65000"/>
-                    <a:lumOff val="35000"/>
-                  </a:schemeClr>
-                </a:solidFill>
-                <a:latin typeface="+mj-lt"/>
-              </a:rPr>
-              <a:t>malesuada</a:t>
-            </a:r>
-            <a:r>
-              <a:rPr lang="en-US" dirty="0">
-                <a:solidFill>
-                  <a:schemeClr val="tx1">
-                    <a:lumMod val="65000"/>
-                    <a:lumOff val="35000"/>
-                  </a:schemeClr>
-                </a:solidFill>
-                <a:latin typeface="+mj-lt"/>
-              </a:rPr>
-              <a:t> libero, sit </a:t>
-            </a:r>
-            <a:r>
-              <a:rPr lang="en-US" dirty="0" err="1">
-                <a:solidFill>
-                  <a:schemeClr val="tx1">
-                    <a:lumMod val="65000"/>
-                    <a:lumOff val="35000"/>
-                  </a:schemeClr>
-                </a:solidFill>
-                <a:latin typeface="+mj-lt"/>
-              </a:rPr>
-              <a:t>amet</a:t>
-            </a:r>
-            <a:r>
-              <a:rPr lang="en-US" dirty="0">
-                <a:solidFill>
-                  <a:schemeClr val="tx1">
-                    <a:lumMod val="65000"/>
-                    <a:lumOff val="35000"/>
-                  </a:schemeClr>
-                </a:solidFill>
-                <a:latin typeface="+mj-lt"/>
-              </a:rPr>
-              <a:t> </a:t>
-            </a:r>
-            <a:r>
-              <a:rPr lang="en-US" dirty="0" err="1">
-                <a:solidFill>
-                  <a:schemeClr val="tx1">
-                    <a:lumMod val="65000"/>
-                    <a:lumOff val="35000"/>
-                  </a:schemeClr>
-                </a:solidFill>
-                <a:latin typeface="+mj-lt"/>
-              </a:rPr>
-              <a:t>commodo</a:t>
-            </a:r>
-            <a:r>
-              <a:rPr lang="en-US" dirty="0">
-                <a:solidFill>
-                  <a:schemeClr val="tx1">
-                    <a:lumMod val="65000"/>
-                    <a:lumOff val="35000"/>
-                  </a:schemeClr>
-                </a:solidFill>
-                <a:latin typeface="+mj-lt"/>
-              </a:rPr>
-              <a:t> magna </a:t>
-            </a:r>
-            <a:r>
-              <a:rPr lang="en-US" dirty="0" err="1">
-                <a:solidFill>
-                  <a:schemeClr val="tx1">
-                    <a:lumMod val="65000"/>
-                    <a:lumOff val="35000"/>
-                  </a:schemeClr>
-                </a:solidFill>
-                <a:latin typeface="+mj-lt"/>
-              </a:rPr>
-              <a:t>eros</a:t>
-            </a:r>
-            <a:r>
-              <a:rPr lang="en-US" dirty="0">
-                <a:solidFill>
-                  <a:schemeClr val="tx1">
-                    <a:lumMod val="65000"/>
-                    <a:lumOff val="35000"/>
-                  </a:schemeClr>
-                </a:solidFill>
-                <a:latin typeface="+mj-lt"/>
-              </a:rPr>
-              <a:t> </a:t>
-            </a:r>
-            <a:r>
-              <a:rPr lang="en-US" dirty="0" err="1">
-                <a:solidFill>
-                  <a:schemeClr val="tx1">
-                    <a:lumMod val="65000"/>
-                    <a:lumOff val="35000"/>
-                  </a:schemeClr>
-                </a:solidFill>
-                <a:latin typeface="+mj-lt"/>
-              </a:rPr>
-              <a:t>quis</a:t>
-            </a:r>
-            <a:r>
-              <a:rPr lang="en-US" dirty="0">
-                <a:solidFill>
-                  <a:schemeClr val="tx1">
-                    <a:lumMod val="65000"/>
-                    <a:lumOff val="35000"/>
-                  </a:schemeClr>
-                </a:solidFill>
-                <a:latin typeface="+mj-lt"/>
-              </a:rPr>
-              <a:t> </a:t>
-            </a:r>
-            <a:r>
-              <a:rPr lang="en-US" dirty="0" err="1">
-                <a:solidFill>
-                  <a:schemeClr val="tx1">
-                    <a:lumMod val="65000"/>
-                    <a:lumOff val="35000"/>
-                  </a:schemeClr>
-                </a:solidFill>
-                <a:latin typeface="+mj-lt"/>
-              </a:rPr>
-              <a:t>urna</a:t>
-            </a:r>
-            <a:r>
-              <a:rPr lang="en-US" dirty="0">
-                <a:solidFill>
-                  <a:schemeClr val="tx1">
-                    <a:lumMod val="65000"/>
-                    <a:lumOff val="35000"/>
-                  </a:schemeClr>
-                </a:solidFill>
-                <a:latin typeface="+mj-lt"/>
-              </a:rPr>
-              <a:t>.</a:t>
-            </a:r>
-          </a:p>
-          <a:p>
-            <a:endParaRPr lang="en-US" dirty="0"/>
-          </a:p>
-        </p:txBody>
-      </p:sp>
-      <p:sp>
-        <p:nvSpPr>
-          <p:cNvPr id="4" name="Footer Placeholder 3">
-            <a:extLst>
-              <a:ext uri="{FF2B5EF4-FFF2-40B4-BE49-F238E27FC236}">
-                <a16:creationId xmlns:a16="http://schemas.microsoft.com/office/drawing/2014/main" id="{971A871B-AA4F-46BE-9425-C5B550CF1CFB}"/>
-              </a:ext>
-            </a:extLst>
-          </p:cNvPr>
-          <p:cNvSpPr>
-            <a:spLocks noGrp="1"/>
-          </p:cNvSpPr>
-          <p:nvPr>
-            <p:ph type="ftr" sz="quarter" idx="11"/>
-          </p:nvPr>
-        </p:nvSpPr>
-        <p:spPr/>
-        <p:txBody>
-          <a:bodyPr/>
-          <a:lstStyle/>
-          <a:p>
-            <a:r>
-              <a:rPr lang="en-US" dirty="0" err="1"/>
-              <a:t>SQLDay</a:t>
-            </a:r>
-            <a:r>
-              <a:rPr lang="en-US" dirty="0"/>
-              <a:t> 202</a:t>
-            </a:r>
-            <a:r>
-              <a:rPr lang="pl-PL" dirty="0"/>
-              <a:t>1</a:t>
-            </a:r>
-            <a:endParaRPr lang="en-US" dirty="0"/>
-          </a:p>
-        </p:txBody>
-      </p:sp>
-    </p:spTree>
-    <p:extLst>
-      <p:ext uri="{BB962C8B-B14F-4D97-AF65-F5344CB8AC3E}">
-        <p14:creationId xmlns:p14="http://schemas.microsoft.com/office/powerpoint/2010/main" val="1355164371"/>
-      </p:ext>
-    </p:extLst>
-  </p:cSld>
-  <p:clrMapOvr>
-    <a:masterClrMapping/>
-  </p:clrMapOvr>
-</p:sld>
-</file>
-
 <file path=ppt/slides/slide5.xml><?xml version="1.0" encoding="utf-8"?>
 <p:sld xmlns:a="http://schemas.openxmlformats.org/drawingml/2006/main" xmlns:r="http://schemas.openxmlformats.org/officeDocument/2006/relationships" xmlns:p="http://schemas.openxmlformats.org/presentationml/2006/main">
   <p:cSld>
@@ -4865,7 +4471,7 @@
           <p:cNvPr id="2" name="Title 1">
             <a:extLst>
               <a:ext uri="{FF2B5EF4-FFF2-40B4-BE49-F238E27FC236}">
-                <a16:creationId xmlns:a16="http://schemas.microsoft.com/office/drawing/2014/main" id="{C89AF66A-54F2-4D01-AF00-55361F8BEC6E}"/>
+                <a16:creationId xmlns:a16="http://schemas.microsoft.com/office/drawing/2014/main" id="{69C35FEE-CDB8-4B2A-8C27-DF337C5BF54E}"/>
               </a:ext>
             </a:extLst>
           </p:cNvPr>
@@ -4874,277 +4480,52 @@
           </p:cNvSpPr>
           <p:nvPr>
             <p:ph type="title"/>
-          </p:nvPr>
-        </p:nvSpPr>
-        <p:spPr/>
-        <p:txBody>
-          <a:bodyPr/>
-          <a:lstStyle/>
-          <a:p>
-            <a:pPr algn="ctr"/>
-            <a:r>
-              <a:rPr lang="pl-PL" spc="300" dirty="0"/>
-              <a:t>SUBSECTION 1</a:t>
-            </a:r>
-            <a:endParaRPr lang="en-US" spc="300" dirty="0"/>
-          </a:p>
-        </p:txBody>
-      </p:sp>
-      <p:sp>
-        <p:nvSpPr>
-          <p:cNvPr id="3" name="Content Placeholder 2">
-            <a:extLst>
-              <a:ext uri="{FF2B5EF4-FFF2-40B4-BE49-F238E27FC236}">
-                <a16:creationId xmlns:a16="http://schemas.microsoft.com/office/drawing/2014/main" id="{11423F17-3B13-442D-BD64-8C6373D5DF0E}"/>
-              </a:ext>
-            </a:extLst>
-          </p:cNvPr>
-          <p:cNvSpPr>
-            <a:spLocks noGrp="1"/>
-          </p:cNvSpPr>
-          <p:nvPr>
-            <p:ph idx="1"/>
           </p:nvPr>
         </p:nvSpPr>
         <p:spPr>
           <a:xfrm>
-            <a:off x="838200" y="2011679"/>
-            <a:ext cx="10515600" cy="4165283"/>
+            <a:off x="831850" y="1709739"/>
+            <a:ext cx="10515600" cy="2496502"/>
           </a:xfrm>
         </p:spPr>
+        <p:txBody>
+          <a:bodyPr/>
+          <a:lstStyle/>
+          <a:p>
+            <a:r>
+              <a:rPr lang="sv-SE" dirty="0" err="1"/>
+              <a:t>Background</a:t>
+            </a:r>
+            <a:endParaRPr lang="en-US" dirty="0"/>
+          </a:p>
+        </p:txBody>
+      </p:sp>
+      <p:sp>
+        <p:nvSpPr>
+          <p:cNvPr id="3" name="Text Placeholder 2">
+            <a:extLst>
+              <a:ext uri="{FF2B5EF4-FFF2-40B4-BE49-F238E27FC236}">
+                <a16:creationId xmlns:a16="http://schemas.microsoft.com/office/drawing/2014/main" id="{C57BFC19-642C-46C0-8599-428A8D1F06F5}"/>
+              </a:ext>
+            </a:extLst>
+          </p:cNvPr>
+          <p:cNvSpPr>
+            <a:spLocks noGrp="1"/>
+          </p:cNvSpPr>
+          <p:nvPr>
+            <p:ph type="body" idx="1"/>
+          </p:nvPr>
+        </p:nvSpPr>
+        <p:spPr/>
         <p:txBody>
           <a:bodyPr>
             <a:normAutofit/>
           </a:bodyPr>
           <a:lstStyle/>
           <a:p>
-            <a:pPr marL="0" indent="0" algn="just">
-              <a:lnSpc>
-                <a:spcPct val="150000"/>
-              </a:lnSpc>
-              <a:buNone/>
-            </a:pPr>
-            <a:r>
-              <a:rPr lang="en-US" sz="2400" dirty="0">
-                <a:latin typeface="+mj-lt"/>
-              </a:rPr>
-              <a:t>Lorem ipsum dolor sit </a:t>
-            </a:r>
-            <a:r>
-              <a:rPr lang="en-US" sz="2400" dirty="0" err="1">
-                <a:latin typeface="+mj-lt"/>
-              </a:rPr>
-              <a:t>amet</a:t>
-            </a:r>
-            <a:r>
-              <a:rPr lang="en-US" sz="2400" dirty="0">
-                <a:latin typeface="+mj-lt"/>
-              </a:rPr>
-              <a:t>, </a:t>
-            </a:r>
-            <a:r>
-              <a:rPr lang="en-US" sz="2400" dirty="0" err="1">
-                <a:latin typeface="+mj-lt"/>
-              </a:rPr>
-              <a:t>consectetuer</a:t>
-            </a:r>
-            <a:r>
-              <a:rPr lang="en-US" sz="2400" dirty="0">
-                <a:latin typeface="+mj-lt"/>
-              </a:rPr>
-              <a:t> </a:t>
-            </a:r>
-            <a:r>
-              <a:rPr lang="en-US" sz="2400" dirty="0" err="1">
-                <a:latin typeface="+mj-lt"/>
-              </a:rPr>
-              <a:t>adipiscing</a:t>
-            </a:r>
-            <a:r>
-              <a:rPr lang="en-US" sz="2400" dirty="0">
-                <a:latin typeface="+mj-lt"/>
-              </a:rPr>
-              <a:t> </a:t>
-            </a:r>
-            <a:r>
-              <a:rPr lang="en-US" sz="2400" dirty="0" err="1">
-                <a:latin typeface="+mj-lt"/>
-              </a:rPr>
-              <a:t>elit</a:t>
-            </a:r>
-            <a:r>
-              <a:rPr lang="en-US" sz="2400" dirty="0">
-                <a:latin typeface="+mj-lt"/>
-              </a:rPr>
-              <a:t>. Maecenas </a:t>
-            </a:r>
-            <a:r>
-              <a:rPr lang="en-US" sz="2400" dirty="0" err="1">
-                <a:latin typeface="+mj-lt"/>
-              </a:rPr>
-              <a:t>porttitor</a:t>
-            </a:r>
-            <a:r>
-              <a:rPr lang="en-US" sz="2400" dirty="0">
-                <a:latin typeface="+mj-lt"/>
-              </a:rPr>
-              <a:t> </a:t>
-            </a:r>
-            <a:r>
-              <a:rPr lang="en-US" sz="2400" dirty="0" err="1">
-                <a:latin typeface="+mj-lt"/>
-              </a:rPr>
-              <a:t>congue</a:t>
-            </a:r>
-            <a:r>
-              <a:rPr lang="en-US" sz="2400" dirty="0">
-                <a:latin typeface="+mj-lt"/>
-              </a:rPr>
-              <a:t> </a:t>
-            </a:r>
-            <a:r>
-              <a:rPr lang="en-US" sz="2400" dirty="0" err="1">
-                <a:latin typeface="+mj-lt"/>
-              </a:rPr>
-              <a:t>massa</a:t>
-            </a:r>
-            <a:r>
-              <a:rPr lang="en-US" sz="2400" dirty="0">
-                <a:latin typeface="+mj-lt"/>
-              </a:rPr>
-              <a:t>. </a:t>
-            </a:r>
-            <a:r>
-              <a:rPr lang="en-US" sz="2400" dirty="0" err="1">
-                <a:latin typeface="+mj-lt"/>
-              </a:rPr>
-              <a:t>Fusce</a:t>
-            </a:r>
-            <a:r>
-              <a:rPr lang="en-US" sz="2400" dirty="0">
-                <a:latin typeface="+mj-lt"/>
-              </a:rPr>
-              <a:t> </a:t>
-            </a:r>
-            <a:r>
-              <a:rPr lang="en-US" sz="2400" dirty="0" err="1">
-                <a:latin typeface="+mj-lt"/>
-              </a:rPr>
-              <a:t>posuere</a:t>
-            </a:r>
-            <a:r>
-              <a:rPr lang="en-US" sz="2400" dirty="0">
-                <a:latin typeface="+mj-lt"/>
-              </a:rPr>
-              <a:t>, magna sed pulvinar </a:t>
-            </a:r>
-            <a:r>
-              <a:rPr lang="en-US" sz="2400" dirty="0" err="1">
-                <a:latin typeface="+mj-lt"/>
-              </a:rPr>
-              <a:t>ultricies</a:t>
-            </a:r>
-            <a:r>
-              <a:rPr lang="en-US" sz="2400" dirty="0">
-                <a:latin typeface="+mj-lt"/>
-              </a:rPr>
-              <a:t>, </a:t>
-            </a:r>
-            <a:r>
-              <a:rPr lang="en-US" sz="2400" dirty="0" err="1">
-                <a:latin typeface="+mj-lt"/>
-              </a:rPr>
-              <a:t>purus</a:t>
-            </a:r>
-            <a:r>
-              <a:rPr lang="en-US" sz="2400" dirty="0">
-                <a:latin typeface="+mj-lt"/>
-              </a:rPr>
-              <a:t> </a:t>
-            </a:r>
-            <a:r>
-              <a:rPr lang="en-US" sz="2400" dirty="0" err="1">
-                <a:latin typeface="+mj-lt"/>
-              </a:rPr>
-              <a:t>lectus</a:t>
-            </a:r>
-            <a:r>
-              <a:rPr lang="en-US" sz="2400" dirty="0">
-                <a:latin typeface="+mj-lt"/>
-              </a:rPr>
-              <a:t> </a:t>
-            </a:r>
-            <a:r>
-              <a:rPr lang="en-US" sz="2400" dirty="0" err="1">
-                <a:latin typeface="+mj-lt"/>
-              </a:rPr>
-              <a:t>malesuada</a:t>
-            </a:r>
-            <a:r>
-              <a:rPr lang="en-US" sz="2400" dirty="0">
-                <a:latin typeface="+mj-lt"/>
-              </a:rPr>
-              <a:t> libero, sit </a:t>
-            </a:r>
-            <a:r>
-              <a:rPr lang="en-US" sz="2400" dirty="0" err="1">
-                <a:latin typeface="+mj-lt"/>
-              </a:rPr>
-              <a:t>amet</a:t>
-            </a:r>
-            <a:r>
-              <a:rPr lang="en-US" sz="2400" dirty="0">
-                <a:latin typeface="+mj-lt"/>
-              </a:rPr>
-              <a:t> </a:t>
-            </a:r>
-            <a:r>
-              <a:rPr lang="en-US" sz="2400" dirty="0" err="1">
-                <a:latin typeface="+mj-lt"/>
-              </a:rPr>
-              <a:t>commodo</a:t>
-            </a:r>
-            <a:r>
-              <a:rPr lang="en-US" sz="2400" dirty="0">
-                <a:latin typeface="+mj-lt"/>
-              </a:rPr>
-              <a:t> magna </a:t>
-            </a:r>
-            <a:r>
-              <a:rPr lang="en-US" sz="2400" dirty="0" err="1">
-                <a:latin typeface="+mj-lt"/>
-              </a:rPr>
-              <a:t>eros</a:t>
-            </a:r>
-            <a:r>
-              <a:rPr lang="en-US" sz="2400" dirty="0">
-                <a:latin typeface="+mj-lt"/>
-              </a:rPr>
-              <a:t> </a:t>
-            </a:r>
-            <a:r>
-              <a:rPr lang="en-US" sz="2400" dirty="0" err="1">
-                <a:latin typeface="+mj-lt"/>
-              </a:rPr>
-              <a:t>quis</a:t>
-            </a:r>
-            <a:r>
-              <a:rPr lang="en-US" sz="2400" dirty="0">
-                <a:latin typeface="+mj-lt"/>
-              </a:rPr>
-              <a:t> </a:t>
-            </a:r>
-            <a:r>
-              <a:rPr lang="en-US" sz="2400" dirty="0" err="1">
-                <a:latin typeface="+mj-lt"/>
-              </a:rPr>
-              <a:t>urna</a:t>
-            </a:r>
-            <a:r>
-              <a:rPr lang="en-US" sz="2400" dirty="0">
-                <a:latin typeface="+mj-lt"/>
-              </a:rPr>
-              <a:t>.</a:t>
+            <a:r>
+              <a:rPr lang="en-US" dirty="0"/>
+              <a:t>Why did I create this presentation in the first place?</a:t>
             </a:r>
           </a:p>
         </p:txBody>
@@ -5154,7 +4535,7 @@
           <p:cNvPr id="4" name="Footer Placeholder 3">
             <a:extLst>
               <a:ext uri="{FF2B5EF4-FFF2-40B4-BE49-F238E27FC236}">
-                <a16:creationId xmlns:a16="http://schemas.microsoft.com/office/drawing/2014/main" id="{F7702435-A989-4B2D-BD9A-94EFE69D6756}"/>
+                <a16:creationId xmlns:a16="http://schemas.microsoft.com/office/drawing/2014/main" id="{971A871B-AA4F-46BE-9425-C5B550CF1CFB}"/>
               </a:ext>
             </a:extLst>
           </p:cNvPr>
@@ -5186,51 +4567,10 @@
           </a:p>
         </p:txBody>
       </p:sp>
-      <p:cxnSp>
-        <p:nvCxnSpPr>
-          <p:cNvPr id="6" name="Straight Connector 5">
-            <a:extLst>
-              <a:ext uri="{FF2B5EF4-FFF2-40B4-BE49-F238E27FC236}">
-                <a16:creationId xmlns:a16="http://schemas.microsoft.com/office/drawing/2014/main" id="{1155B08E-A3D6-4D20-AE68-F6EEC7FDE111}"/>
-              </a:ext>
-            </a:extLst>
-          </p:cNvPr>
-          <p:cNvCxnSpPr/>
-          <p:nvPr/>
-        </p:nvCxnSpPr>
-        <p:spPr>
-          <a:xfrm>
-            <a:off x="3546764" y="1699491"/>
-            <a:ext cx="5089236" cy="0"/>
-          </a:xfrm>
-          <a:prstGeom prst="line">
-            <a:avLst/>
-          </a:prstGeom>
-          <a:ln>
-            <a:solidFill>
-              <a:srgbClr val="FBAB28"/>
-            </a:solidFill>
-          </a:ln>
-        </p:spPr>
-        <p:style>
-          <a:lnRef idx="1">
-            <a:schemeClr val="accent1"/>
-          </a:lnRef>
-          <a:fillRef idx="0">
-            <a:schemeClr val="accent1"/>
-          </a:fillRef>
-          <a:effectRef idx="0">
-            <a:schemeClr val="accent1"/>
-          </a:effectRef>
-          <a:fontRef idx="minor">
-            <a:schemeClr val="tx1"/>
-          </a:fontRef>
-        </p:style>
-      </p:cxnSp>
     </p:spTree>
     <p:extLst>
       <p:ext uri="{BB962C8B-B14F-4D97-AF65-F5344CB8AC3E}">
-        <p14:creationId xmlns:p14="http://schemas.microsoft.com/office/powerpoint/2010/main" val="585557992"/>
+        <p14:creationId xmlns:p14="http://schemas.microsoft.com/office/powerpoint/2010/main" val="4142983531"/>
       </p:ext>
     </p:extLst>
   </p:cSld>
@@ -5243,20 +4583,6 @@
 <file path=ppt/slides/slide6.xml><?xml version="1.0" encoding="utf-8"?>
 <p:sld xmlns:a="http://schemas.openxmlformats.org/drawingml/2006/main" xmlns:r="http://schemas.openxmlformats.org/officeDocument/2006/relationships" xmlns:p="http://schemas.openxmlformats.org/presentationml/2006/main">
   <p:cSld>
-    <p:bg>
-      <p:bgPr>
-        <a:blipFill dpi="0" rotWithShape="1">
-          <a:blip r:embed="rId2">
-            <a:lum/>
-          </a:blip>
-          <a:srcRect/>
-          <a:stretch>
-            <a:fillRect/>
-          </a:stretch>
-        </a:blipFill>
-        <a:effectLst/>
-      </p:bgPr>
-    </p:bg>
     <p:spTree>
       <p:nvGrpSpPr>
         <p:cNvPr id="1" name=""/>
@@ -5273,18 +4599,18 @@
       </p:grpSpPr>
       <p:sp>
         <p:nvSpPr>
-          <p:cNvPr id="3" name="Content Placeholder 2">
-            <a:extLst>
-              <a:ext uri="{FF2B5EF4-FFF2-40B4-BE49-F238E27FC236}">
-                <a16:creationId xmlns:a16="http://schemas.microsoft.com/office/drawing/2014/main" id="{E54376F1-F4C9-4FCA-A0F6-E7DDB8BC7F79}"/>
-              </a:ext>
-            </a:extLst>
-          </p:cNvPr>
-          <p:cNvSpPr>
-            <a:spLocks noGrp="1"/>
-          </p:cNvSpPr>
-          <p:nvPr>
-            <p:ph sz="half" idx="1"/>
+          <p:cNvPr id="11" name="Rubrik 10">
+            <a:extLst>
+              <a:ext uri="{FF2B5EF4-FFF2-40B4-BE49-F238E27FC236}">
+                <a16:creationId xmlns:a16="http://schemas.microsoft.com/office/drawing/2014/main" id="{0C066A6B-8C9E-47FC-B83A-40B3A7E66062}"/>
+              </a:ext>
+            </a:extLst>
+          </p:cNvPr>
+          <p:cNvSpPr>
+            <a:spLocks noGrp="1"/>
+          </p:cNvSpPr>
+          <p:nvPr>
+            <p:ph type="title"/>
           </p:nvPr>
         </p:nvSpPr>
         <p:spPr/>
@@ -5292,304 +4618,149 @@
           <a:bodyPr/>
           <a:lstStyle/>
           <a:p>
-            <a:pPr>
-              <a:lnSpc>
-                <a:spcPct val="120000"/>
-              </a:lnSpc>
-              <a:spcAft>
-                <a:spcPts val="1200"/>
-              </a:spcAft>
-            </a:pPr>
-            <a:r>
-              <a:rPr lang="en-US" sz="2400" dirty="0">
-                <a:latin typeface="+mj-lt"/>
-              </a:rPr>
-              <a:t>Nunc </a:t>
-            </a:r>
-            <a:r>
-              <a:rPr lang="en-US" sz="2400" dirty="0" err="1">
-                <a:latin typeface="+mj-lt"/>
-              </a:rPr>
-              <a:t>viverra</a:t>
-            </a:r>
-            <a:r>
-              <a:rPr lang="en-US" sz="2400" dirty="0">
-                <a:latin typeface="+mj-lt"/>
-              </a:rPr>
+            <a:r>
+              <a:rPr lang="sv-SE" dirty="0"/>
+              <a:t>Demo</a:t>
+            </a:r>
+          </a:p>
+        </p:txBody>
+      </p:sp>
+      <p:sp>
+        <p:nvSpPr>
+          <p:cNvPr id="12" name="Platshållare för innehåll 11">
+            <a:extLst>
+              <a:ext uri="{FF2B5EF4-FFF2-40B4-BE49-F238E27FC236}">
+                <a16:creationId xmlns:a16="http://schemas.microsoft.com/office/drawing/2014/main" id="{C59C9CDE-009B-4F7B-8B30-A16E1B759829}"/>
+              </a:ext>
+            </a:extLst>
+          </p:cNvPr>
+          <p:cNvSpPr>
+            <a:spLocks noGrp="1"/>
+          </p:cNvSpPr>
+          <p:nvPr>
+            <p:ph idx="1"/>
+          </p:nvPr>
+        </p:nvSpPr>
+        <p:spPr/>
+        <p:txBody>
+          <a:bodyPr/>
+          <a:lstStyle/>
+          <a:p>
+            <a:r>
+              <a:rPr lang="sv-SE" dirty="0"/>
+              <a:t>The </a:t>
+            </a:r>
+            <a:r>
+              <a:rPr lang="sv-SE" dirty="0" err="1"/>
+              <a:t>nature</a:t>
+            </a:r>
+            <a:r>
+              <a:rPr lang="sv-SE" dirty="0"/>
               <a:t> </a:t>
             </a:r>
             <a:r>
-              <a:rPr lang="en-US" sz="2400" dirty="0" err="1">
-                <a:latin typeface="+mj-lt"/>
-              </a:rPr>
-              <a:t>imperdiet</a:t>
-            </a:r>
-            <a:r>
-              <a:rPr lang="en-US" sz="2400" dirty="0">
-                <a:latin typeface="+mj-lt"/>
-              </a:rPr>
+              <a:rPr lang="sv-SE" dirty="0" err="1"/>
+              <a:t>of</a:t>
+            </a:r>
+            <a:r>
+              <a:rPr lang="sv-SE" dirty="0"/>
               <a:t> </a:t>
             </a:r>
             <a:r>
-              <a:rPr lang="en-US" sz="2400" dirty="0" err="1">
-                <a:latin typeface="+mj-lt"/>
-              </a:rPr>
-              <a:t>enim</a:t>
-            </a:r>
-            <a:r>
-              <a:rPr lang="en-US" sz="2400" dirty="0">
-                <a:latin typeface="+mj-lt"/>
-              </a:rPr>
-              <a:t>. </a:t>
-            </a:r>
-            <a:r>
-              <a:rPr lang="en-US" sz="2400" dirty="0" err="1">
-                <a:latin typeface="+mj-lt"/>
-              </a:rPr>
-              <a:t>Fusce</a:t>
-            </a:r>
-            <a:r>
-              <a:rPr lang="en-US" sz="2400" dirty="0">
-                <a:latin typeface="+mj-lt"/>
-              </a:rPr>
-              <a:t> est. </a:t>
-            </a:r>
-            <a:r>
-              <a:rPr lang="en-US" sz="2400" dirty="0" err="1">
-                <a:latin typeface="+mj-lt"/>
-              </a:rPr>
-              <a:t>Vivamus</a:t>
-            </a:r>
-            <a:r>
-              <a:rPr lang="en-US" sz="2400" dirty="0">
-                <a:latin typeface="+mj-lt"/>
-              </a:rPr>
-              <a:t> a </a:t>
-            </a:r>
-            <a:r>
-              <a:rPr lang="en-US" sz="2400" dirty="0" err="1">
-                <a:latin typeface="+mj-lt"/>
-              </a:rPr>
-              <a:t>tellus</a:t>
-            </a:r>
-            <a:r>
-              <a:rPr lang="en-US" sz="2400" dirty="0">
-                <a:latin typeface="+mj-lt"/>
-              </a:rPr>
-              <a:t>.</a:t>
-            </a:r>
-          </a:p>
-          <a:p>
-            <a:pPr>
-              <a:lnSpc>
-                <a:spcPct val="120000"/>
-              </a:lnSpc>
-              <a:spcAft>
-                <a:spcPts val="1200"/>
-              </a:spcAft>
-            </a:pPr>
-            <a:r>
-              <a:rPr lang="en-US" sz="2400" dirty="0" err="1">
-                <a:latin typeface="+mj-lt"/>
-              </a:rPr>
-              <a:t>Pellentesque</a:t>
-            </a:r>
-            <a:r>
-              <a:rPr lang="en-US" sz="2400" dirty="0">
-                <a:latin typeface="+mj-lt"/>
-              </a:rPr>
-              <a:t> habitant </a:t>
-            </a:r>
-            <a:r>
-              <a:rPr lang="en-US" sz="2400" dirty="0" err="1">
-                <a:latin typeface="+mj-lt"/>
-              </a:rPr>
-              <a:t>morbi</a:t>
-            </a:r>
-            <a:r>
-              <a:rPr lang="en-US" sz="2400" dirty="0">
-                <a:latin typeface="+mj-lt"/>
-              </a:rPr>
+              <a:rPr lang="sv-SE" dirty="0" err="1"/>
+              <a:t>our</a:t>
+            </a:r>
+            <a:r>
+              <a:rPr lang="sv-SE" dirty="0"/>
+              <a:t> problem</a:t>
+            </a:r>
+          </a:p>
+          <a:p>
+            <a:r>
+              <a:rPr lang="sv-SE" dirty="0"/>
+              <a:t>The cause </a:t>
+            </a:r>
+            <a:r>
+              <a:rPr lang="sv-SE" dirty="0" err="1"/>
+              <a:t>of</a:t>
+            </a:r>
+            <a:r>
+              <a:rPr lang="sv-SE" dirty="0"/>
               <a:t> </a:t>
             </a:r>
             <a:r>
-              <a:rPr lang="en-US" sz="2400" dirty="0" err="1">
-                <a:latin typeface="+mj-lt"/>
-              </a:rPr>
-              <a:t>tristique</a:t>
-            </a:r>
-            <a:r>
-              <a:rPr lang="en-US" sz="2400" dirty="0">
-                <a:latin typeface="+mj-lt"/>
-              </a:rPr>
+              <a:rPr lang="sv-SE" dirty="0" err="1"/>
+              <a:t>our</a:t>
+            </a:r>
+            <a:r>
+              <a:rPr lang="sv-SE" dirty="0"/>
+              <a:t> problem</a:t>
+            </a:r>
+          </a:p>
+          <a:p>
+            <a:r>
+              <a:rPr lang="sv-SE" dirty="0" err="1"/>
+              <a:t>Possible</a:t>
+            </a:r>
+            <a:r>
+              <a:rPr lang="sv-SE" dirty="0"/>
+              <a:t> solutions</a:t>
+            </a:r>
+          </a:p>
+          <a:p>
+            <a:r>
+              <a:rPr lang="sv-SE" dirty="0"/>
+              <a:t>If we have </a:t>
+            </a:r>
+            <a:r>
+              <a:rPr lang="sv-SE" dirty="0" err="1"/>
+              <a:t>time</a:t>
+            </a:r>
+            <a:r>
+              <a:rPr lang="sv-SE" dirty="0"/>
+              <a:t> – </a:t>
+            </a:r>
+            <a:r>
+              <a:rPr lang="sv-SE" dirty="0" err="1"/>
+              <a:t>Cardinality</a:t>
+            </a:r>
+            <a:r>
+              <a:rPr lang="sv-SE" dirty="0"/>
               <a:t> </a:t>
             </a:r>
             <a:r>
-              <a:rPr lang="en-US" sz="2400" dirty="0" err="1">
-                <a:latin typeface="+mj-lt"/>
-              </a:rPr>
-              <a:t>senectus</a:t>
-            </a:r>
-            <a:r>
-              <a:rPr lang="en-US" sz="2400" dirty="0">
-                <a:latin typeface="+mj-lt"/>
-              </a:rPr>
-              <a:t> et </a:t>
-            </a:r>
-            <a:r>
-              <a:rPr lang="en-US" sz="2400" dirty="0" err="1">
-                <a:latin typeface="+mj-lt"/>
-              </a:rPr>
-              <a:t>netus</a:t>
-            </a:r>
-            <a:r>
-              <a:rPr lang="en-US" sz="2400" dirty="0">
-                <a:latin typeface="+mj-lt"/>
-              </a:rPr>
-              <a:t> et </a:t>
-            </a:r>
-            <a:r>
-              <a:rPr lang="en-US" sz="2400" dirty="0" err="1">
-                <a:latin typeface="+mj-lt"/>
-              </a:rPr>
-              <a:t>malesuada</a:t>
-            </a:r>
-            <a:r>
-              <a:rPr lang="en-US" sz="2400" dirty="0">
-                <a:latin typeface="+mj-lt"/>
-              </a:rPr>
-              <a:t> fames ac </a:t>
-            </a:r>
-            <a:r>
-              <a:rPr lang="en-US" sz="2400" dirty="0" err="1">
-                <a:latin typeface="+mj-lt"/>
-              </a:rPr>
-              <a:t>turpis</a:t>
-            </a:r>
-            <a:r>
-              <a:rPr lang="en-US" sz="2400" dirty="0">
-                <a:latin typeface="+mj-lt"/>
-              </a:rPr>
+              <a:rPr lang="sv-SE" dirty="0" err="1"/>
+              <a:t>Estimation</a:t>
+            </a:r>
+            <a:r>
+              <a:rPr lang="sv-SE" dirty="0"/>
               <a:t> </a:t>
             </a:r>
             <a:r>
-              <a:rPr lang="en-US" sz="2400" dirty="0" err="1">
-                <a:latin typeface="+mj-lt"/>
-              </a:rPr>
-              <a:t>egestas</a:t>
-            </a:r>
-            <a:r>
-              <a:rPr lang="en-US" sz="2400" dirty="0">
-                <a:latin typeface="+mj-lt"/>
-              </a:rPr>
-              <a:t>. </a:t>
-            </a:r>
-            <a:r>
-              <a:rPr lang="en-US" sz="2400" dirty="0" err="1">
-                <a:latin typeface="+mj-lt"/>
-              </a:rPr>
-              <a:t>Proin</a:t>
-            </a:r>
-            <a:r>
-              <a:rPr lang="en-US" sz="2400" dirty="0">
-                <a:latin typeface="+mj-lt"/>
-              </a:rPr>
-              <a:t> pharetra </a:t>
-            </a:r>
-            <a:r>
-              <a:rPr lang="en-US" sz="2400" dirty="0" err="1">
-                <a:latin typeface="+mj-lt"/>
-              </a:rPr>
-              <a:t>nonummy</a:t>
-            </a:r>
-            <a:r>
-              <a:rPr lang="en-US" sz="2400" dirty="0">
-                <a:latin typeface="+mj-lt"/>
-              </a:rPr>
-              <a:t> </a:t>
-            </a:r>
-            <a:r>
-              <a:rPr lang="en-US" sz="2400" dirty="0" err="1">
-                <a:latin typeface="+mj-lt"/>
-              </a:rPr>
-              <a:t>pede</a:t>
-            </a:r>
-            <a:r>
-              <a:rPr lang="en-US" sz="2400" dirty="0">
-                <a:latin typeface="+mj-lt"/>
-              </a:rPr>
-              <a:t>. </a:t>
-            </a:r>
-            <a:r>
-              <a:rPr lang="en-US" sz="2400" dirty="0" err="1">
-                <a:latin typeface="+mj-lt"/>
-              </a:rPr>
-              <a:t>Mauris</a:t>
-            </a:r>
-            <a:r>
-              <a:rPr lang="en-US" sz="2400" dirty="0">
-                <a:latin typeface="+mj-lt"/>
-              </a:rPr>
-              <a:t> et </a:t>
-            </a:r>
-            <a:r>
-              <a:rPr lang="en-US" sz="2400" dirty="0" err="1">
-                <a:latin typeface="+mj-lt"/>
-              </a:rPr>
-              <a:t>orci</a:t>
-            </a:r>
-            <a:r>
-              <a:rPr lang="en-US" sz="2400" dirty="0">
-                <a:latin typeface="+mj-lt"/>
-              </a:rPr>
-              <a:t>.</a:t>
-            </a:r>
-          </a:p>
-          <a:p>
-            <a:endParaRPr lang="en-US" dirty="0">
-              <a:latin typeface="+mj-lt"/>
-            </a:endParaRPr>
-          </a:p>
-        </p:txBody>
-      </p:sp>
-      <p:sp>
-        <p:nvSpPr>
-          <p:cNvPr id="4" name="Content Placeholder 3">
-            <a:extLst>
-              <a:ext uri="{FF2B5EF4-FFF2-40B4-BE49-F238E27FC236}">
-                <a16:creationId xmlns:a16="http://schemas.microsoft.com/office/drawing/2014/main" id="{7ADE430B-7D2B-4BC7-B3BC-5D94343F0FC5}"/>
-              </a:ext>
-            </a:extLst>
-          </p:cNvPr>
-          <p:cNvSpPr>
-            <a:spLocks noGrp="1"/>
-          </p:cNvSpPr>
-          <p:nvPr>
-            <p:ph sz="half" idx="2"/>
-          </p:nvPr>
-        </p:nvSpPr>
-        <p:spPr>
-          <a:xfrm>
-            <a:off x="6172200" y="1825625"/>
-            <a:ext cx="5181600" cy="4351338"/>
-          </a:xfrm>
-        </p:spPr>
-        <p:txBody>
-          <a:bodyPr/>
-          <a:lstStyle/>
-          <a:p>
-            <a:endParaRPr lang="en-US" dirty="0">
-              <a:latin typeface="+mj-lt"/>
-            </a:endParaRPr>
-          </a:p>
-        </p:txBody>
-      </p:sp>
-      <p:sp>
-        <p:nvSpPr>
-          <p:cNvPr id="5" name="Footer Placeholder 4">
-            <a:extLst>
-              <a:ext uri="{FF2B5EF4-FFF2-40B4-BE49-F238E27FC236}">
-                <a16:creationId xmlns:a16="http://schemas.microsoft.com/office/drawing/2014/main" id="{AC194606-9FFB-48FC-B9A9-C3BBEFFC8121}"/>
+              <a:rPr lang="sv-SE" dirty="0" err="1"/>
+              <a:t>before</a:t>
+            </a:r>
+            <a:r>
+              <a:rPr lang="sv-SE" dirty="0"/>
+              <a:t> and </a:t>
+            </a:r>
+            <a:r>
+              <a:rPr lang="sv-SE" dirty="0" err="1"/>
+              <a:t>after</a:t>
+            </a:r>
+            <a:r>
+              <a:rPr lang="sv-SE"/>
+              <a:t> SQL Server 2014.</a:t>
+            </a:r>
+          </a:p>
+        </p:txBody>
+      </p:sp>
+      <p:sp>
+        <p:nvSpPr>
+          <p:cNvPr id="4" name="Platshållare för sidfot 3">
+            <a:extLst>
+              <a:ext uri="{FF2B5EF4-FFF2-40B4-BE49-F238E27FC236}">
+                <a16:creationId xmlns:a16="http://schemas.microsoft.com/office/drawing/2014/main" id="{C483D765-4366-4E79-A790-836230B5E588}"/>
               </a:ext>
             </a:extLst>
           </p:cNvPr>
@@ -5606,101 +4777,16 @@
           <a:lstStyle/>
           <a:p>
             <a:r>
-              <a:rPr lang="en-US" dirty="0" err="1"/>
-              <a:t>SQLDay</a:t>
-            </a:r>
-            <a:r>
-              <a:rPr lang="en-US" dirty="0"/>
-              <a:t> 202</a:t>
-            </a:r>
-            <a:r>
-              <a:rPr lang="pl-PL" dirty="0"/>
-              <a:t>1</a:t>
-            </a:r>
-            <a:endParaRPr lang="en-US" dirty="0"/>
-          </a:p>
-        </p:txBody>
-      </p:sp>
-      <p:sp>
-        <p:nvSpPr>
-          <p:cNvPr id="6" name="Title 1">
-            <a:extLst>
-              <a:ext uri="{FF2B5EF4-FFF2-40B4-BE49-F238E27FC236}">
-                <a16:creationId xmlns:a16="http://schemas.microsoft.com/office/drawing/2014/main" id="{E91DB9FC-BE47-4118-AA01-0567E554E57C}"/>
-              </a:ext>
-            </a:extLst>
-          </p:cNvPr>
-          <p:cNvSpPr>
-            <a:spLocks noGrp="1"/>
-          </p:cNvSpPr>
-          <p:nvPr>
-            <p:ph type="title"/>
-          </p:nvPr>
-        </p:nvSpPr>
-        <p:spPr>
-          <a:xfrm>
-            <a:off x="838200" y="365125"/>
-            <a:ext cx="10515600" cy="1325563"/>
-          </a:xfrm>
-        </p:spPr>
-        <p:txBody>
-          <a:bodyPr/>
-          <a:lstStyle/>
-          <a:p>
-            <a:pPr algn="ctr"/>
-            <a:r>
-              <a:rPr lang="pl-PL" spc="300" dirty="0"/>
-              <a:t>SUBSECTION 2</a:t>
-            </a:r>
-            <a:endParaRPr lang="en-US" spc="300" dirty="0"/>
-          </a:p>
-        </p:txBody>
-      </p:sp>
-      <p:cxnSp>
-        <p:nvCxnSpPr>
-          <p:cNvPr id="7" name="Straight Connector 6">
-            <a:extLst>
-              <a:ext uri="{FF2B5EF4-FFF2-40B4-BE49-F238E27FC236}">
-                <a16:creationId xmlns:a16="http://schemas.microsoft.com/office/drawing/2014/main" id="{50CD78FF-48F0-435C-831D-F259E3BEB83E}"/>
-              </a:ext>
-            </a:extLst>
-          </p:cNvPr>
-          <p:cNvCxnSpPr/>
-          <p:nvPr/>
-        </p:nvCxnSpPr>
-        <p:spPr>
-          <a:xfrm>
-            <a:off x="3546764" y="1699491"/>
-            <a:ext cx="5089236" cy="0"/>
-          </a:xfrm>
-          <a:prstGeom prst="line">
-            <a:avLst/>
-          </a:prstGeom>
-          <a:ln>
-            <a:solidFill>
-              <a:srgbClr val="FBAB28"/>
-            </a:solidFill>
-          </a:ln>
-        </p:spPr>
-        <p:style>
-          <a:lnRef idx="1">
-            <a:schemeClr val="accent1"/>
-          </a:lnRef>
-          <a:fillRef idx="0">
-            <a:schemeClr val="accent1"/>
-          </a:fillRef>
-          <a:effectRef idx="0">
-            <a:schemeClr val="accent1"/>
-          </a:effectRef>
-          <a:fontRef idx="minor">
-            <a:schemeClr val="tx1"/>
-          </a:fontRef>
-        </p:style>
-      </p:cxnSp>
+              <a:rPr lang="en-US"/>
+              <a:t>SQLDay 2020</a:t>
+            </a:r>
+          </a:p>
+        </p:txBody>
+      </p:sp>
     </p:spTree>
     <p:extLst>
       <p:ext uri="{BB962C8B-B14F-4D97-AF65-F5344CB8AC3E}">
-        <p14:creationId xmlns:p14="http://schemas.microsoft.com/office/powerpoint/2010/main" val="828418514"/>
+        <p14:creationId xmlns:p14="http://schemas.microsoft.com/office/powerpoint/2010/main" val="2020272159"/>
       </p:ext>
     </p:extLst>
   </p:cSld>
@@ -5711,599 +4797,6 @@
 </file>
 
 <file path=ppt/slides/slide7.xml><?xml version="1.0" encoding="utf-8"?>
-<p:sld xmlns:a="http://schemas.openxmlformats.org/drawingml/2006/main" xmlns:r="http://schemas.openxmlformats.org/officeDocument/2006/relationships" xmlns:p="http://schemas.openxmlformats.org/presentationml/2006/main">
-  <p:cSld>
-    <p:bg>
-      <p:bgPr>
-        <a:blipFill dpi="0" rotWithShape="1">
-          <a:blip r:embed="rId2">
-            <a:lum/>
-          </a:blip>
-          <a:srcRect/>
-          <a:stretch>
-            <a:fillRect/>
-          </a:stretch>
-        </a:blipFill>
-        <a:effectLst/>
-      </p:bgPr>
-    </p:bg>
-    <p:spTree>
-      <p:nvGrpSpPr>
-        <p:cNvPr id="1" name=""/>
-        <p:cNvGrpSpPr/>
-        <p:nvPr/>
-      </p:nvGrpSpPr>
-      <p:grpSpPr>
-        <a:xfrm>
-          <a:off x="0" y="0"/>
-          <a:ext cx="0" cy="0"/>
-          <a:chOff x="0" y="0"/>
-          <a:chExt cx="0" cy="0"/>
-        </a:xfrm>
-      </p:grpSpPr>
-      <p:sp>
-        <p:nvSpPr>
-          <p:cNvPr id="2" name="Title 1">
-            <a:extLst>
-              <a:ext uri="{FF2B5EF4-FFF2-40B4-BE49-F238E27FC236}">
-                <a16:creationId xmlns:a16="http://schemas.microsoft.com/office/drawing/2014/main" id="{69C35FEE-CDB8-4B2A-8C27-DF337C5BF54E}"/>
-              </a:ext>
-            </a:extLst>
-          </p:cNvPr>
-          <p:cNvSpPr>
-            <a:spLocks noGrp="1"/>
-          </p:cNvSpPr>
-          <p:nvPr>
-            <p:ph type="title"/>
-          </p:nvPr>
-        </p:nvSpPr>
-        <p:spPr>
-          <a:xfrm>
-            <a:off x="831850" y="1709739"/>
-            <a:ext cx="10515600" cy="2496502"/>
-          </a:xfrm>
-        </p:spPr>
-        <p:txBody>
-          <a:bodyPr/>
-          <a:lstStyle/>
-          <a:p>
-            <a:r>
-              <a:rPr lang="pl-PL" dirty="0"/>
-              <a:t>POINT 2</a:t>
-            </a:r>
-            <a:endParaRPr lang="en-US" dirty="0"/>
-          </a:p>
-        </p:txBody>
-      </p:sp>
-      <p:sp>
-        <p:nvSpPr>
-          <p:cNvPr id="3" name="Text Placeholder 2">
-            <a:extLst>
-              <a:ext uri="{FF2B5EF4-FFF2-40B4-BE49-F238E27FC236}">
-                <a16:creationId xmlns:a16="http://schemas.microsoft.com/office/drawing/2014/main" id="{C57BFC19-642C-46C0-8599-428A8D1F06F5}"/>
-              </a:ext>
-            </a:extLst>
-          </p:cNvPr>
-          <p:cNvSpPr>
-            <a:spLocks noGrp="1"/>
-          </p:cNvSpPr>
-          <p:nvPr>
-            <p:ph type="body" idx="1"/>
-          </p:nvPr>
-        </p:nvSpPr>
-        <p:spPr/>
-        <p:txBody>
-          <a:bodyPr>
-            <a:normAutofit fontScale="92500" lnSpcReduction="10000"/>
-          </a:bodyPr>
-          <a:lstStyle/>
-          <a:p>
-            <a:pPr algn="just">
-              <a:lnSpc>
-                <a:spcPct val="150000"/>
-              </a:lnSpc>
-            </a:pPr>
-            <a:r>
-              <a:rPr lang="en-US" dirty="0">
-                <a:solidFill>
-                  <a:schemeClr val="tx1">
-                    <a:lumMod val="65000"/>
-                    <a:lumOff val="35000"/>
-                  </a:schemeClr>
-                </a:solidFill>
-                <a:latin typeface="+mj-lt"/>
-              </a:rPr>
-              <a:t>Lorem ipsum dolor sit </a:t>
-            </a:r>
-            <a:r>
-              <a:rPr lang="en-US" dirty="0" err="1">
-                <a:solidFill>
-                  <a:schemeClr val="tx1">
-                    <a:lumMod val="65000"/>
-                    <a:lumOff val="35000"/>
-                  </a:schemeClr>
-                </a:solidFill>
-                <a:latin typeface="+mj-lt"/>
-              </a:rPr>
-              <a:t>amet</a:t>
-            </a:r>
-            <a:r>
-              <a:rPr lang="en-US" dirty="0">
-                <a:solidFill>
-                  <a:schemeClr val="tx1">
-                    <a:lumMod val="65000"/>
-                    <a:lumOff val="35000"/>
-                  </a:schemeClr>
-                </a:solidFill>
-                <a:latin typeface="+mj-lt"/>
-              </a:rPr>
-              <a:t>, </a:t>
-            </a:r>
-            <a:r>
-              <a:rPr lang="en-US" dirty="0" err="1">
-                <a:solidFill>
-                  <a:schemeClr val="tx1">
-                    <a:lumMod val="65000"/>
-                    <a:lumOff val="35000"/>
-                  </a:schemeClr>
-                </a:solidFill>
-                <a:latin typeface="+mj-lt"/>
-              </a:rPr>
-              <a:t>consectetuer</a:t>
-            </a:r>
-            <a:r>
-              <a:rPr lang="en-US" dirty="0">
-                <a:solidFill>
-                  <a:schemeClr val="tx1">
-                    <a:lumMod val="65000"/>
-                    <a:lumOff val="35000"/>
-                  </a:schemeClr>
-                </a:solidFill>
-                <a:latin typeface="+mj-lt"/>
-              </a:rPr>
-              <a:t> </a:t>
-            </a:r>
-            <a:r>
-              <a:rPr lang="en-US" dirty="0" err="1">
-                <a:solidFill>
-                  <a:schemeClr val="tx1">
-                    <a:lumMod val="65000"/>
-                    <a:lumOff val="35000"/>
-                  </a:schemeClr>
-                </a:solidFill>
-                <a:latin typeface="+mj-lt"/>
-              </a:rPr>
-              <a:t>adipiscing</a:t>
-            </a:r>
-            <a:r>
-              <a:rPr lang="en-US" dirty="0">
-                <a:solidFill>
-                  <a:schemeClr val="tx1">
-                    <a:lumMod val="65000"/>
-                    <a:lumOff val="35000"/>
-                  </a:schemeClr>
-                </a:solidFill>
-                <a:latin typeface="+mj-lt"/>
-              </a:rPr>
-              <a:t> </a:t>
-            </a:r>
-            <a:r>
-              <a:rPr lang="en-US" dirty="0" err="1">
-                <a:solidFill>
-                  <a:schemeClr val="tx1">
-                    <a:lumMod val="65000"/>
-                    <a:lumOff val="35000"/>
-                  </a:schemeClr>
-                </a:solidFill>
-                <a:latin typeface="+mj-lt"/>
-              </a:rPr>
-              <a:t>elit</a:t>
-            </a:r>
-            <a:r>
-              <a:rPr lang="en-US" dirty="0">
-                <a:solidFill>
-                  <a:schemeClr val="tx1">
-                    <a:lumMod val="65000"/>
-                    <a:lumOff val="35000"/>
-                  </a:schemeClr>
-                </a:solidFill>
-                <a:latin typeface="+mj-lt"/>
-              </a:rPr>
-              <a:t>. Maecenas </a:t>
-            </a:r>
-            <a:r>
-              <a:rPr lang="en-US" dirty="0" err="1">
-                <a:solidFill>
-                  <a:schemeClr val="tx1">
-                    <a:lumMod val="65000"/>
-                    <a:lumOff val="35000"/>
-                  </a:schemeClr>
-                </a:solidFill>
-                <a:latin typeface="+mj-lt"/>
-              </a:rPr>
-              <a:t>porttitor</a:t>
-            </a:r>
-            <a:r>
-              <a:rPr lang="en-US" dirty="0">
-                <a:solidFill>
-                  <a:schemeClr val="tx1">
-                    <a:lumMod val="65000"/>
-                    <a:lumOff val="35000"/>
-                  </a:schemeClr>
-                </a:solidFill>
-                <a:latin typeface="+mj-lt"/>
-              </a:rPr>
-              <a:t> </a:t>
-            </a:r>
-            <a:r>
-              <a:rPr lang="en-US" dirty="0" err="1">
-                <a:solidFill>
-                  <a:schemeClr val="tx1">
-                    <a:lumMod val="65000"/>
-                    <a:lumOff val="35000"/>
-                  </a:schemeClr>
-                </a:solidFill>
-                <a:latin typeface="+mj-lt"/>
-              </a:rPr>
-              <a:t>congue</a:t>
-            </a:r>
-            <a:r>
-              <a:rPr lang="en-US" dirty="0">
-                <a:solidFill>
-                  <a:schemeClr val="tx1">
-                    <a:lumMod val="65000"/>
-                    <a:lumOff val="35000"/>
-                  </a:schemeClr>
-                </a:solidFill>
-                <a:latin typeface="+mj-lt"/>
-              </a:rPr>
-              <a:t> </a:t>
-            </a:r>
-            <a:r>
-              <a:rPr lang="en-US" dirty="0" err="1">
-                <a:solidFill>
-                  <a:schemeClr val="tx1">
-                    <a:lumMod val="65000"/>
-                    <a:lumOff val="35000"/>
-                  </a:schemeClr>
-                </a:solidFill>
-                <a:latin typeface="+mj-lt"/>
-              </a:rPr>
-              <a:t>massa</a:t>
-            </a:r>
-            <a:r>
-              <a:rPr lang="en-US" dirty="0">
-                <a:solidFill>
-                  <a:schemeClr val="tx1">
-                    <a:lumMod val="65000"/>
-                    <a:lumOff val="35000"/>
-                  </a:schemeClr>
-                </a:solidFill>
-                <a:latin typeface="+mj-lt"/>
-              </a:rPr>
-              <a:t>. </a:t>
-            </a:r>
-            <a:r>
-              <a:rPr lang="en-US" dirty="0" err="1">
-                <a:solidFill>
-                  <a:schemeClr val="tx1">
-                    <a:lumMod val="65000"/>
-                    <a:lumOff val="35000"/>
-                  </a:schemeClr>
-                </a:solidFill>
-                <a:latin typeface="+mj-lt"/>
-              </a:rPr>
-              <a:t>Fusce</a:t>
-            </a:r>
-            <a:r>
-              <a:rPr lang="en-US" dirty="0">
-                <a:solidFill>
-                  <a:schemeClr val="tx1">
-                    <a:lumMod val="65000"/>
-                    <a:lumOff val="35000"/>
-                  </a:schemeClr>
-                </a:solidFill>
-                <a:latin typeface="+mj-lt"/>
-              </a:rPr>
-              <a:t> </a:t>
-            </a:r>
-            <a:r>
-              <a:rPr lang="en-US" dirty="0" err="1">
-                <a:solidFill>
-                  <a:schemeClr val="tx1">
-                    <a:lumMod val="65000"/>
-                    <a:lumOff val="35000"/>
-                  </a:schemeClr>
-                </a:solidFill>
-                <a:latin typeface="+mj-lt"/>
-              </a:rPr>
-              <a:t>posuere</a:t>
-            </a:r>
-            <a:r>
-              <a:rPr lang="en-US" dirty="0">
-                <a:solidFill>
-                  <a:schemeClr val="tx1">
-                    <a:lumMod val="65000"/>
-                    <a:lumOff val="35000"/>
-                  </a:schemeClr>
-                </a:solidFill>
-                <a:latin typeface="+mj-lt"/>
-              </a:rPr>
-              <a:t>, magna sed pulvinar </a:t>
-            </a:r>
-            <a:r>
-              <a:rPr lang="en-US" dirty="0" err="1">
-                <a:solidFill>
-                  <a:schemeClr val="tx1">
-                    <a:lumMod val="65000"/>
-                    <a:lumOff val="35000"/>
-                  </a:schemeClr>
-                </a:solidFill>
-                <a:latin typeface="+mj-lt"/>
-              </a:rPr>
-              <a:t>ultricies</a:t>
-            </a:r>
-            <a:r>
-              <a:rPr lang="en-US" dirty="0">
-                <a:solidFill>
-                  <a:schemeClr val="tx1">
-                    <a:lumMod val="65000"/>
-                    <a:lumOff val="35000"/>
-                  </a:schemeClr>
-                </a:solidFill>
-                <a:latin typeface="+mj-lt"/>
-              </a:rPr>
-              <a:t>, </a:t>
-            </a:r>
-            <a:r>
-              <a:rPr lang="en-US" dirty="0" err="1">
-                <a:solidFill>
-                  <a:schemeClr val="tx1">
-                    <a:lumMod val="65000"/>
-                    <a:lumOff val="35000"/>
-                  </a:schemeClr>
-                </a:solidFill>
-                <a:latin typeface="+mj-lt"/>
-              </a:rPr>
-              <a:t>purus</a:t>
-            </a:r>
-            <a:r>
-              <a:rPr lang="en-US" dirty="0">
-                <a:solidFill>
-                  <a:schemeClr val="tx1">
-                    <a:lumMod val="65000"/>
-                    <a:lumOff val="35000"/>
-                  </a:schemeClr>
-                </a:solidFill>
-                <a:latin typeface="+mj-lt"/>
-              </a:rPr>
-              <a:t> </a:t>
-            </a:r>
-            <a:r>
-              <a:rPr lang="en-US" dirty="0" err="1">
-                <a:solidFill>
-                  <a:schemeClr val="tx1">
-                    <a:lumMod val="65000"/>
-                    <a:lumOff val="35000"/>
-                  </a:schemeClr>
-                </a:solidFill>
-                <a:latin typeface="+mj-lt"/>
-              </a:rPr>
-              <a:t>lectus</a:t>
-            </a:r>
-            <a:r>
-              <a:rPr lang="en-US" dirty="0">
-                <a:solidFill>
-                  <a:schemeClr val="tx1">
-                    <a:lumMod val="65000"/>
-                    <a:lumOff val="35000"/>
-                  </a:schemeClr>
-                </a:solidFill>
-                <a:latin typeface="+mj-lt"/>
-              </a:rPr>
-              <a:t> </a:t>
-            </a:r>
-            <a:r>
-              <a:rPr lang="en-US" dirty="0" err="1">
-                <a:solidFill>
-                  <a:schemeClr val="tx1">
-                    <a:lumMod val="65000"/>
-                    <a:lumOff val="35000"/>
-                  </a:schemeClr>
-                </a:solidFill>
-                <a:latin typeface="+mj-lt"/>
-              </a:rPr>
-              <a:t>malesuada</a:t>
-            </a:r>
-            <a:r>
-              <a:rPr lang="en-US" dirty="0">
-                <a:solidFill>
-                  <a:schemeClr val="tx1">
-                    <a:lumMod val="65000"/>
-                    <a:lumOff val="35000"/>
-                  </a:schemeClr>
-                </a:solidFill>
-                <a:latin typeface="+mj-lt"/>
-              </a:rPr>
-              <a:t> libero, sit </a:t>
-            </a:r>
-            <a:r>
-              <a:rPr lang="en-US" dirty="0" err="1">
-                <a:solidFill>
-                  <a:schemeClr val="tx1">
-                    <a:lumMod val="65000"/>
-                    <a:lumOff val="35000"/>
-                  </a:schemeClr>
-                </a:solidFill>
-                <a:latin typeface="+mj-lt"/>
-              </a:rPr>
-              <a:t>amet</a:t>
-            </a:r>
-            <a:r>
-              <a:rPr lang="en-US" dirty="0">
-                <a:solidFill>
-                  <a:schemeClr val="tx1">
-                    <a:lumMod val="65000"/>
-                    <a:lumOff val="35000"/>
-                  </a:schemeClr>
-                </a:solidFill>
-                <a:latin typeface="+mj-lt"/>
-              </a:rPr>
-              <a:t> </a:t>
-            </a:r>
-            <a:r>
-              <a:rPr lang="en-US" dirty="0" err="1">
-                <a:solidFill>
-                  <a:schemeClr val="tx1">
-                    <a:lumMod val="65000"/>
-                    <a:lumOff val="35000"/>
-                  </a:schemeClr>
-                </a:solidFill>
-                <a:latin typeface="+mj-lt"/>
-              </a:rPr>
-              <a:t>commodo</a:t>
-            </a:r>
-            <a:r>
-              <a:rPr lang="en-US" dirty="0">
-                <a:solidFill>
-                  <a:schemeClr val="tx1">
-                    <a:lumMod val="65000"/>
-                    <a:lumOff val="35000"/>
-                  </a:schemeClr>
-                </a:solidFill>
-                <a:latin typeface="+mj-lt"/>
-              </a:rPr>
-              <a:t> magna </a:t>
-            </a:r>
-            <a:r>
-              <a:rPr lang="en-US" dirty="0" err="1">
-                <a:solidFill>
-                  <a:schemeClr val="tx1">
-                    <a:lumMod val="65000"/>
-                    <a:lumOff val="35000"/>
-                  </a:schemeClr>
-                </a:solidFill>
-                <a:latin typeface="+mj-lt"/>
-              </a:rPr>
-              <a:t>eros</a:t>
-            </a:r>
-            <a:r>
-              <a:rPr lang="en-US" dirty="0">
-                <a:solidFill>
-                  <a:schemeClr val="tx1">
-                    <a:lumMod val="65000"/>
-                    <a:lumOff val="35000"/>
-                  </a:schemeClr>
-                </a:solidFill>
-                <a:latin typeface="+mj-lt"/>
-              </a:rPr>
-              <a:t> </a:t>
-            </a:r>
-            <a:r>
-              <a:rPr lang="en-US" dirty="0" err="1">
-                <a:solidFill>
-                  <a:schemeClr val="tx1">
-                    <a:lumMod val="65000"/>
-                    <a:lumOff val="35000"/>
-                  </a:schemeClr>
-                </a:solidFill>
-                <a:latin typeface="+mj-lt"/>
-              </a:rPr>
-              <a:t>quis</a:t>
-            </a:r>
-            <a:r>
-              <a:rPr lang="en-US" dirty="0">
-                <a:solidFill>
-                  <a:schemeClr val="tx1">
-                    <a:lumMod val="65000"/>
-                    <a:lumOff val="35000"/>
-                  </a:schemeClr>
-                </a:solidFill>
-                <a:latin typeface="+mj-lt"/>
-              </a:rPr>
-              <a:t> </a:t>
-            </a:r>
-            <a:r>
-              <a:rPr lang="en-US" dirty="0" err="1">
-                <a:solidFill>
-                  <a:schemeClr val="tx1">
-                    <a:lumMod val="65000"/>
-                    <a:lumOff val="35000"/>
-                  </a:schemeClr>
-                </a:solidFill>
-                <a:latin typeface="+mj-lt"/>
-              </a:rPr>
-              <a:t>urna</a:t>
-            </a:r>
-            <a:r>
-              <a:rPr lang="en-US" dirty="0">
-                <a:solidFill>
-                  <a:schemeClr val="tx1">
-                    <a:lumMod val="65000"/>
-                    <a:lumOff val="35000"/>
-                  </a:schemeClr>
-                </a:solidFill>
-                <a:latin typeface="+mj-lt"/>
-              </a:rPr>
-              <a:t>.</a:t>
-            </a:r>
-          </a:p>
-          <a:p>
-            <a:endParaRPr lang="en-US" dirty="0"/>
-          </a:p>
-        </p:txBody>
-      </p:sp>
-      <p:sp>
-        <p:nvSpPr>
-          <p:cNvPr id="4" name="Footer Placeholder 3">
-            <a:extLst>
-              <a:ext uri="{FF2B5EF4-FFF2-40B4-BE49-F238E27FC236}">
-                <a16:creationId xmlns:a16="http://schemas.microsoft.com/office/drawing/2014/main" id="{971A871B-AA4F-46BE-9425-C5B550CF1CFB}"/>
-              </a:ext>
-            </a:extLst>
-          </p:cNvPr>
-          <p:cNvSpPr>
-            <a:spLocks noGrp="1"/>
-          </p:cNvSpPr>
-          <p:nvPr>
-            <p:ph type="ftr" sz="quarter" idx="11"/>
-          </p:nvPr>
-        </p:nvSpPr>
-        <p:spPr/>
-        <p:txBody>
-          <a:bodyPr/>
-          <a:lstStyle/>
-          <a:p>
-            <a:r>
-              <a:rPr lang="en-US" dirty="0" err="1"/>
-              <a:t>SQLDay</a:t>
-            </a:r>
-            <a:r>
-              <a:rPr lang="en-US" dirty="0"/>
-              <a:t> 202</a:t>
-            </a:r>
-            <a:r>
-              <a:rPr lang="pl-PL" dirty="0"/>
-              <a:t>1</a:t>
-            </a:r>
-            <a:endParaRPr lang="en-US" dirty="0"/>
-          </a:p>
-        </p:txBody>
-      </p:sp>
-    </p:spTree>
-    <p:extLst>
-      <p:ext uri="{BB962C8B-B14F-4D97-AF65-F5344CB8AC3E}">
-        <p14:creationId xmlns:p14="http://schemas.microsoft.com/office/powerpoint/2010/main" val="4142983531"/>
-      </p:ext>
-    </p:extLst>
-  </p:cSld>
-  <p:clrMapOvr>
-    <a:masterClrMapping/>
-  </p:clrMapOvr>
-</p:sld>
-</file>
-
-<file path=ppt/slides/slide8.xml><?xml version="1.0" encoding="utf-8"?>
 <p:sld xmlns:a="http://schemas.openxmlformats.org/drawingml/2006/main" xmlns:r="http://schemas.openxmlformats.org/officeDocument/2006/relationships" xmlns:p="http://schemas.openxmlformats.org/presentationml/2006/main">
   <p:cSld>
     <p:bg>

</xml_diff>